<commit_message>
Completed initial implementation of Log File Reader
</commit_message>
<xml_diff>
--- a/doc/TMS Overview.pptx
+++ b/doc/TMS Overview.pptx
@@ -6,12 +6,13 @@
   </p:sldMasterIdLst>
   <p:sldIdLst>
     <p:sldId id="256" r:id="rId2"/>
-    <p:sldId id="258" r:id="rId3"/>
-    <p:sldId id="260" r:id="rId4"/>
-    <p:sldId id="257" r:id="rId5"/>
-    <p:sldId id="262" r:id="rId6"/>
-    <p:sldId id="259" r:id="rId7"/>
-    <p:sldId id="261" r:id="rId8"/>
+    <p:sldId id="263" r:id="rId3"/>
+    <p:sldId id="257" r:id="rId4"/>
+    <p:sldId id="258" r:id="rId5"/>
+    <p:sldId id="260" r:id="rId6"/>
+    <p:sldId id="262" r:id="rId7"/>
+    <p:sldId id="259" r:id="rId8"/>
+    <p:sldId id="261" r:id="rId9"/>
   </p:sldIdLst>
   <p:sldSz cx="9144000" cy="6858000" type="screen4x3"/>
   <p:notesSz cx="6858000" cy="9144000"/>
@@ -309,7 +310,7 @@
           <a:p>
             <a:fld id="{679BC7E7-EA8E-4DA7-915E-CC098D9BADCB}" type="datetimeFigureOut">
               <a:rPr lang="en-US" smtClean="0"/>
-              <a:t>11/17/15</a:t>
+              <a:t>12/21/15</a:t>
             </a:fld>
             <a:endParaRPr lang="en-US"/>
           </a:p>
@@ -438,7 +439,7 @@
           <a:p>
             <a:fld id="{679BC7E7-EA8E-4DA7-915E-CC098D9BADCB}" type="datetimeFigureOut">
               <a:rPr lang="en-US" smtClean="0"/>
-              <a:t>11/17/15</a:t>
+              <a:t>12/21/15</a:t>
             </a:fld>
             <a:endParaRPr lang="en-US"/>
           </a:p>
@@ -743,7 +744,7 @@
           <a:p>
             <a:fld id="{679BC7E7-EA8E-4DA7-915E-CC098D9BADCB}" type="datetimeFigureOut">
               <a:rPr lang="en-US" smtClean="0"/>
-              <a:t>11/17/15</a:t>
+              <a:t>12/21/15</a:t>
             </a:fld>
             <a:endParaRPr lang="en-US"/>
           </a:p>
@@ -968,7 +969,7 @@
           <a:p>
             <a:fld id="{679BC7E7-EA8E-4DA7-915E-CC098D9BADCB}" type="datetimeFigureOut">
               <a:rPr lang="en-US" smtClean="0"/>
-              <a:t>11/17/15</a:t>
+              <a:t>12/21/15</a:t>
             </a:fld>
             <a:endParaRPr lang="en-US"/>
           </a:p>
@@ -1238,7 +1239,7 @@
           <a:p>
             <a:fld id="{679BC7E7-EA8E-4DA7-915E-CC098D9BADCB}" type="datetimeFigureOut">
               <a:rPr lang="en-US" smtClean="0"/>
-              <a:t>11/17/15</a:t>
+              <a:t>12/21/15</a:t>
             </a:fld>
             <a:endParaRPr lang="en-US"/>
           </a:p>
@@ -1563,7 +1564,7 @@
           <a:p>
             <a:fld id="{679BC7E7-EA8E-4DA7-915E-CC098D9BADCB}" type="datetimeFigureOut">
               <a:rPr lang="en-US" smtClean="0"/>
-              <a:t>11/17/15</a:t>
+              <a:t>12/21/15</a:t>
             </a:fld>
             <a:endParaRPr lang="en-US"/>
           </a:p>
@@ -1756,7 +1757,7 @@
           <a:p>
             <a:fld id="{679BC7E7-EA8E-4DA7-915E-CC098D9BADCB}" type="datetimeFigureOut">
               <a:rPr lang="en-US" smtClean="0"/>
-              <a:t>11/17/15</a:t>
+              <a:t>12/21/15</a:t>
             </a:fld>
             <a:endParaRPr lang="en-US"/>
           </a:p>
@@ -1860,7 +1861,7 @@
           <a:p>
             <a:fld id="{679BC7E7-EA8E-4DA7-915E-CC098D9BADCB}" type="datetimeFigureOut">
               <a:rPr lang="en-US" smtClean="0"/>
-              <a:t>11/17/15</a:t>
+              <a:t>12/21/15</a:t>
             </a:fld>
             <a:endParaRPr lang="en-US"/>
           </a:p>
@@ -2029,7 +2030,7 @@
           <a:p>
             <a:fld id="{679BC7E7-EA8E-4DA7-915E-CC098D9BADCB}" type="datetimeFigureOut">
               <a:rPr lang="en-US" smtClean="0"/>
-              <a:t>11/17/15</a:t>
+              <a:t>12/21/15</a:t>
             </a:fld>
             <a:endParaRPr lang="en-US"/>
           </a:p>
@@ -2293,7 +2294,7 @@
           <a:p>
             <a:fld id="{679BC7E7-EA8E-4DA7-915E-CC098D9BADCB}" type="datetimeFigureOut">
               <a:rPr lang="en-US" smtClean="0"/>
-              <a:t>11/17/15</a:t>
+              <a:t>12/21/15</a:t>
             </a:fld>
             <a:endParaRPr lang="en-US"/>
           </a:p>
@@ -2627,7 +2628,7 @@
           <a:p>
             <a:fld id="{679BC7E7-EA8E-4DA7-915E-CC098D9BADCB}" type="datetimeFigureOut">
               <a:rPr lang="en-US" smtClean="0"/>
-              <a:t>11/17/15</a:t>
+              <a:t>12/21/15</a:t>
             </a:fld>
             <a:endParaRPr lang="en-US"/>
           </a:p>
@@ -3068,7 +3069,7 @@
           <a:p>
             <a:fld id="{679BC7E7-EA8E-4DA7-915E-CC098D9BADCB}" type="datetimeFigureOut">
               <a:rPr lang="en-US" smtClean="0"/>
-              <a:t>11/17/15</a:t>
+              <a:t>12/21/15</a:t>
             </a:fld>
             <a:endParaRPr lang="en-US"/>
           </a:p>
@@ -3266,7 +3267,7 @@
           <a:p>
             <a:fld id="{679BC7E7-EA8E-4DA7-915E-CC098D9BADCB}" type="datetimeFigureOut">
               <a:rPr lang="en-US" smtClean="0"/>
-              <a:t>11/17/15</a:t>
+              <a:t>12/21/15</a:t>
             </a:fld>
             <a:endParaRPr lang="en-US"/>
           </a:p>
@@ -3549,7 +3550,7 @@
           <a:p>
             <a:fld id="{679BC7E7-EA8E-4DA7-915E-CC098D9BADCB}" type="datetimeFigureOut">
               <a:rPr lang="en-US" smtClean="0"/>
-              <a:t>11/17/15</a:t>
+              <a:t>12/21/15</a:t>
             </a:fld>
             <a:endParaRPr lang="en-US"/>
           </a:p>
@@ -3917,7 +3918,7 @@
           <a:p>
             <a:fld id="{679BC7E7-EA8E-4DA7-915E-CC098D9BADCB}" type="datetimeFigureOut">
               <a:rPr lang="en-US" smtClean="0"/>
-              <a:t>11/17/15</a:t>
+              <a:t>12/21/15</a:t>
             </a:fld>
             <a:endParaRPr lang="en-US"/>
           </a:p>
@@ -4413,7 +4414,7 @@
           <a:p>
             <a:fld id="{679BC7E7-EA8E-4DA7-915E-CC098D9BADCB}" type="datetimeFigureOut">
               <a:rPr lang="en-US" smtClean="0"/>
-              <a:t>11/17/15</a:t>
+              <a:t>12/21/15</a:t>
             </a:fld>
             <a:endParaRPr lang="en-US"/>
           </a:p>
@@ -4622,7 +4623,7 @@
           <a:p>
             <a:fld id="{679BC7E7-EA8E-4DA7-915E-CC098D9BADCB}" type="datetimeFigureOut">
               <a:rPr lang="en-US" smtClean="0"/>
-              <a:t>11/17/15</a:t>
+              <a:t>12/21/15</a:t>
             </a:fld>
             <a:endParaRPr lang="en-US"/>
           </a:p>
@@ -5133,6 +5134,13 @@
   <p:clrMapOvr>
     <a:masterClrMapping/>
   </p:clrMapOvr>
+  <p:timing>
+    <p:tnLst>
+      <p:par>
+        <p:cTn xmlns:p14="http://schemas.microsoft.com/office/powerpoint/2010/main" id="1" dur="indefinite" restart="never" nodeType="tmRoot"/>
+      </p:par>
+    </p:tnLst>
+  </p:timing>
 </p:sld>
 </file>
 
@@ -5171,7 +5179,7 @@
             <a:pPr algn="l"/>
             <a:r>
               <a:rPr lang="en-US" dirty="0" smtClean="0"/>
-              <a:t>Key Features</a:t>
+              <a:t>Open Questions:</a:t>
             </a:r>
             <a:endParaRPr lang="en-US" dirty="0"/>
           </a:p>
@@ -5208,8 +5216,8 @@
               </a:spcBef>
             </a:pPr>
             <a:r>
-              <a:rPr lang="en-US" sz="2000" dirty="0" smtClean="0"/>
-              <a:t>Familiar tabular environment to manage, manipulate, and analyze data</a:t>
+              <a:rPr lang="en-US" dirty="0" smtClean="0"/>
+              <a:t>Do I have anything?</a:t>
             </a:r>
           </a:p>
           <a:p>
@@ -5222,8 +5230,8 @@
               </a:spcBef>
             </a:pPr>
             <a:r>
-              <a:rPr lang="en-US" sz="2000" dirty="0" smtClean="0"/>
-              <a:t>Native support for complex (as well as simple) data types</a:t>
+              <a:rPr lang="en-US" dirty="0" smtClean="0"/>
+              <a:t>How do I characterize what I have (what’s the “elevator pitch”)?</a:t>
             </a:r>
           </a:p>
           <a:p>
@@ -5236,9 +5244,10 @@
               </a:spcBef>
             </a:pPr>
             <a:r>
-              <a:rPr lang="en-US" sz="2000" dirty="0" smtClean="0"/>
-              <a:t>Derivable rows, columns and cells</a:t>
-            </a:r>
+              <a:rPr lang="en-US" dirty="0" smtClean="0"/>
+              <a:t>How do I “market/publicize” what I have?</a:t>
+            </a:r>
+            <a:endParaRPr lang="en-US" dirty="0" smtClean="0"/>
           </a:p>
           <a:p>
             <a:pPr>
@@ -5250,8 +5259,8 @@
               </a:spcBef>
             </a:pPr>
             <a:r>
-              <a:rPr lang="en-US" sz="2000" dirty="0" smtClean="0"/>
-              <a:t>Support for compute-intensive/asynchronous derivations</a:t>
+              <a:rPr lang="en-US" dirty="0" smtClean="0"/>
+              <a:t>Who else should I talk with?</a:t>
             </a:r>
           </a:p>
           <a:p>
@@ -5264,17 +5273,10 @@
               </a:spcBef>
             </a:pPr>
             <a:r>
-              <a:rPr lang="en-US" sz="2000" dirty="0" smtClean="0"/>
-              <a:t>Robust </a:t>
-            </a:r>
-            <a:r>
-              <a:rPr lang="en-US" sz="2000" dirty="0"/>
-              <a:t>dependency </a:t>
-            </a:r>
-            <a:r>
-              <a:rPr lang="en-US" sz="2000" dirty="0" smtClean="0"/>
-              <a:t>engine</a:t>
-            </a:r>
+              <a:rPr lang="en-US" dirty="0" smtClean="0"/>
+              <a:t>Alternate name: Consumable Data, serving up your data your way</a:t>
+            </a:r>
+            <a:endParaRPr lang="en-US" dirty="0" smtClean="0"/>
           </a:p>
           <a:p>
             <a:pPr>
@@ -5285,85 +5287,27 @@
                 <a:spcPts val="1200"/>
               </a:spcBef>
             </a:pPr>
-            <a:r>
-              <a:rPr lang="en-US" sz="2000" dirty="0" smtClean="0"/>
-              <a:t>Rational environment to develop extensions</a:t>
-            </a:r>
-            <a:endParaRPr lang="en-US" sz="2000" dirty="0"/>
-          </a:p>
-          <a:p>
-            <a:pPr>
-              <a:lnSpc>
-                <a:spcPct val="80000"/>
-              </a:lnSpc>
-              <a:spcBef>
-                <a:spcPts val="1200"/>
-              </a:spcBef>
-            </a:pPr>
-            <a:r>
-              <a:rPr lang="en-US" sz="2000" dirty="0" smtClean="0"/>
-              <a:t>Extensible operators and operator overloading:</a:t>
-            </a:r>
-          </a:p>
-          <a:p>
-            <a:pPr lvl="1">
-              <a:lnSpc>
-                <a:spcPct val="80000"/>
-              </a:lnSpc>
-              <a:spcBef>
-                <a:spcPts val="1200"/>
-              </a:spcBef>
-            </a:pPr>
-            <a:r>
-              <a:rPr lang="en-US" dirty="0"/>
-              <a:t>using </a:t>
-            </a:r>
-            <a:r>
-              <a:rPr lang="en-US" dirty="0" smtClean="0"/>
-              <a:t>Groovy (at runtime)</a:t>
-            </a:r>
-            <a:endParaRPr lang="en-US" dirty="0"/>
-          </a:p>
-          <a:p>
-            <a:pPr lvl="1">
-              <a:lnSpc>
-                <a:spcPct val="80000"/>
-              </a:lnSpc>
-              <a:spcBef>
-                <a:spcPts val="1200"/>
-              </a:spcBef>
-            </a:pPr>
-            <a:r>
-              <a:rPr lang="en-US" dirty="0" smtClean="0"/>
-              <a:t>using Java</a:t>
-            </a:r>
-          </a:p>
-          <a:p>
-            <a:pPr lvl="1">
-              <a:lnSpc>
-                <a:spcPct val="80000"/>
-              </a:lnSpc>
-              <a:spcBef>
-                <a:spcPts val="1200"/>
-              </a:spcBef>
-            </a:pPr>
-            <a:r>
-              <a:rPr lang="en-US" dirty="0" smtClean="0"/>
-              <a:t>using closures (lambda expressions)</a:t>
-            </a:r>
+            <a:endParaRPr lang="en-US" dirty="0" smtClean="0"/>
           </a:p>
         </p:txBody>
       </p:sp>
     </p:spTree>
     <p:extLst>
       <p:ext uri="{BB962C8B-B14F-4D97-AF65-F5344CB8AC3E}">
-        <p14:creationId xmlns:p14="http://schemas.microsoft.com/office/powerpoint/2010/main" val="3224151931"/>
+        <p14:creationId xmlns:p14="http://schemas.microsoft.com/office/powerpoint/2010/main" val="4261670387"/>
       </p:ext>
     </p:extLst>
   </p:cSld>
   <p:clrMapOvr>
     <a:masterClrMapping/>
   </p:clrMapOvr>
+  <p:timing>
+    <p:tnLst>
+      <p:par>
+        <p:cTn xmlns:p14="http://schemas.microsoft.com/office/powerpoint/2010/main" id="1" dur="indefinite" restart="never" nodeType="tmRoot"/>
+      </p:par>
+    </p:tnLst>
+  </p:timing>
 </p:sld>
 </file>
 
@@ -5402,7 +5346,7 @@
             <a:pPr algn="l"/>
             <a:r>
               <a:rPr lang="en-US" dirty="0" smtClean="0"/>
-              <a:t>Sauces and Pickles</a:t>
+              <a:t>What is TMS?</a:t>
             </a:r>
             <a:endParaRPr lang="en-US" dirty="0"/>
           </a:p>
@@ -5418,150 +5362,98 @@
             <p:ph idx="1"/>
           </p:nvPr>
         </p:nvSpPr>
-        <p:spPr>
-          <a:xfrm>
-            <a:off x="739775" y="2486384"/>
-            <a:ext cx="7662864" cy="3890323"/>
-          </a:xfrm>
-        </p:spPr>
-        <p:txBody>
-          <a:bodyPr>
-            <a:normAutofit fontScale="92500" lnSpcReduction="20000"/>
-          </a:bodyPr>
-          <a:lstStyle/>
-          <a:p>
-            <a:pPr>
-              <a:lnSpc>
-                <a:spcPct val="90000"/>
-              </a:lnSpc>
-              <a:spcBef>
-                <a:spcPts val="1400"/>
-              </a:spcBef>
-            </a:pPr>
+        <p:spPr/>
+        <p:txBody>
+          <a:bodyPr/>
+          <a:lstStyle/>
+          <a:p>
             <a:r>
               <a:rPr lang="en-US" dirty="0" smtClean="0"/>
-              <a:t>Packaged with over 250 built-in operators</a:t>
-            </a:r>
-          </a:p>
-          <a:p>
-            <a:pPr>
-              <a:lnSpc>
-                <a:spcPct val="90000"/>
-              </a:lnSpc>
-              <a:spcBef>
-                <a:spcPts val="1400"/>
-              </a:spcBef>
-            </a:pPr>
+              <a:t>A </a:t>
+            </a:r>
+            <a:r>
+              <a:rPr lang="en-US" dirty="0" smtClean="0"/>
+              <a:t>development </a:t>
+            </a:r>
             <a:r>
               <a:rPr lang="en-US" dirty="0"/>
-              <a:t>Integrated support for </a:t>
-            </a:r>
-            <a:r>
-              <a:rPr lang="en-US" dirty="0" err="1"/>
-              <a:t>RESTful</a:t>
+              <a:t>f</a:t>
+            </a:r>
+            <a:r>
+              <a:rPr lang="en-US" dirty="0" smtClean="0"/>
+              <a:t>ramework </a:t>
+            </a:r>
+            <a:r>
+              <a:rPr lang="en-US" dirty="0" smtClean="0"/>
+              <a:t>for </a:t>
+            </a:r>
+            <a:r>
+              <a:rPr lang="en-US" dirty="0" smtClean="0"/>
+              <a:t>modeling </a:t>
+            </a:r>
+            <a:r>
+              <a:rPr lang="en-US" dirty="0" smtClean="0"/>
+              <a:t>and </a:t>
+            </a:r>
+            <a:r>
+              <a:rPr lang="en-US" i="1" dirty="0" smtClean="0"/>
+              <a:t>ad-hoc</a:t>
+            </a:r>
+            <a:r>
+              <a:rPr lang="en-US" dirty="0" smtClean="0"/>
+              <a:t> </a:t>
             </a:r>
             <a:r>
               <a:rPr lang="en-US" dirty="0"/>
-              <a:t> Web Services</a:t>
-            </a:r>
-          </a:p>
-          <a:p>
-            <a:pPr>
-              <a:lnSpc>
-                <a:spcPct val="90000"/>
-              </a:lnSpc>
-              <a:spcBef>
-                <a:spcPts val="1400"/>
-              </a:spcBef>
-            </a:pPr>
+              <a:t>d</a:t>
+            </a:r>
             <a:r>
               <a:rPr lang="en-US" dirty="0" smtClean="0"/>
-              <a:t>Feature-rich Excel integration (import and export, formulas)</a:t>
-            </a:r>
-          </a:p>
-          <a:p>
-            <a:pPr>
-              <a:lnSpc>
-                <a:spcPct val="90000"/>
-              </a:lnSpc>
-              <a:spcBef>
-                <a:spcPts val="1400"/>
-              </a:spcBef>
-            </a:pPr>
+              <a:t>ata </a:t>
+            </a:r>
+            <a:r>
+              <a:rPr lang="en-US" dirty="0"/>
+              <a:t>a</a:t>
+            </a:r>
             <a:r>
               <a:rPr lang="en-US" dirty="0" smtClean="0"/>
-              <a:t>PDF, HTML, and MS Word export</a:t>
-            </a:r>
-          </a:p>
-          <a:p>
-            <a:pPr>
-              <a:lnSpc>
-                <a:spcPct val="90000"/>
-              </a:lnSpc>
-              <a:spcBef>
-                <a:spcPts val="1400"/>
-              </a:spcBef>
-            </a:pPr>
+              <a:t>nalysis </a:t>
+            </a:r>
+            <a:r>
+              <a:rPr lang="en-US" dirty="0"/>
+              <a:t>a</a:t>
+            </a:r>
             <a:r>
               <a:rPr lang="en-US" dirty="0" smtClean="0"/>
-              <a:t>IFS to PFS to IFS expression parsing &amp; generation; can translate formulas from one language to another</a:t>
-            </a:r>
-          </a:p>
-          <a:p>
-            <a:pPr>
-              <a:lnSpc>
-                <a:spcPct val="90000"/>
-              </a:lnSpc>
-              <a:spcBef>
-                <a:spcPts val="1400"/>
-              </a:spcBef>
-            </a:pPr>
+              <a:t>pplications</a:t>
+            </a:r>
+            <a:endParaRPr lang="en-US" dirty="0" smtClean="0"/>
+          </a:p>
+          <a:p>
             <a:r>
               <a:rPr lang="en-US" dirty="0" smtClean="0"/>
-              <a:t>Hybrid tables (RDBMS integration)</a:t>
-            </a:r>
-          </a:p>
-          <a:p>
-            <a:pPr>
-              <a:lnSpc>
-                <a:spcPct val="90000"/>
-              </a:lnSpc>
-              <a:spcBef>
-                <a:spcPts val="1400"/>
-              </a:spcBef>
-            </a:pPr>
+              <a:t>A robust subsystem for computed fields in </a:t>
+            </a:r>
+            <a:r>
+              <a:rPr lang="en-US" dirty="0" err="1" smtClean="0"/>
+              <a:t>SaaS</a:t>
+            </a:r>
             <a:r>
               <a:rPr lang="en-US" dirty="0" smtClean="0"/>
-              <a:t>Cell validation/transformation support</a:t>
-            </a:r>
-          </a:p>
-          <a:p>
-            <a:pPr>
-              <a:lnSpc>
-                <a:spcPct val="90000"/>
-              </a:lnSpc>
-              <a:spcBef>
-                <a:spcPts val="1400"/>
-              </a:spcBef>
-            </a:pPr>
+              <a:t> applications</a:t>
+            </a:r>
+          </a:p>
+          <a:p>
             <a:r>
               <a:rPr lang="en-US" dirty="0" smtClean="0"/>
-              <a:t>Event listener support</a:t>
-            </a:r>
-          </a:p>
-          <a:p>
-            <a:pPr>
-              <a:lnSpc>
-                <a:spcPct val="90000"/>
-              </a:lnSpc>
-              <a:spcBef>
-                <a:spcPts val="1400"/>
-              </a:spcBef>
-            </a:pPr>
-            <a:r>
-              <a:rPr lang="en-US" dirty="0" smtClean="0"/>
-              <a:t>Tagging</a:t>
-            </a:r>
+              <a:t>???</a:t>
+            </a:r>
+          </a:p>
+          <a:p>
+            <a:endParaRPr lang="en-US" dirty="0" smtClean="0"/>
+          </a:p>
+          <a:p>
+            <a:endParaRPr lang="en-US" dirty="0" smtClean="0"/>
           </a:p>
           <a:p>
             <a:endParaRPr lang="en-US" dirty="0"/>
@@ -5571,13 +5463,20 @@
     </p:spTree>
     <p:extLst>
       <p:ext uri="{BB962C8B-B14F-4D97-AF65-F5344CB8AC3E}">
-        <p14:creationId xmlns:p14="http://schemas.microsoft.com/office/powerpoint/2010/main" val="843770871"/>
+        <p14:creationId xmlns:p14="http://schemas.microsoft.com/office/powerpoint/2010/main" val="4034642467"/>
       </p:ext>
     </p:extLst>
   </p:cSld>
   <p:clrMapOvr>
     <a:masterClrMapping/>
   </p:clrMapOvr>
+  <p:timing>
+    <p:tnLst>
+      <p:par>
+        <p:cTn xmlns:p14="http://schemas.microsoft.com/office/powerpoint/2010/main" id="1" dur="indefinite" restart="never" nodeType="tmRoot"/>
+      </p:par>
+    </p:tnLst>
+  </p:timing>
 </p:sld>
 </file>
 
@@ -5616,7 +5515,7 @@
             <a:pPr algn="l"/>
             <a:r>
               <a:rPr lang="en-US" dirty="0" smtClean="0"/>
-              <a:t>What is TMS?</a:t>
+              <a:t>Key Features</a:t>
             </a:r>
             <a:endParaRPr lang="en-US" dirty="0"/>
           </a:p>
@@ -5632,40 +5531,202 @@
             <p:ph idx="1"/>
           </p:nvPr>
         </p:nvSpPr>
-        <p:spPr/>
-        <p:txBody>
-          <a:bodyPr/>
-          <a:lstStyle/>
-          <a:p>
+        <p:spPr>
+          <a:xfrm>
+            <a:off x="457199" y="2513404"/>
+            <a:ext cx="8419945" cy="3971383"/>
+          </a:xfrm>
+        </p:spPr>
+        <p:txBody>
+          <a:bodyPr>
+            <a:normAutofit/>
+          </a:bodyPr>
+          <a:lstStyle/>
+          <a:p>
+            <a:pPr>
+              <a:lnSpc>
+                <a:spcPct val="80000"/>
+              </a:lnSpc>
+              <a:spcBef>
+                <a:spcPts val="1200"/>
+              </a:spcBef>
+            </a:pPr>
+            <a:r>
+              <a:rPr lang="en-US" sz="2000" dirty="0" smtClean="0"/>
+              <a:t>Familiar tabular environment to manage, manipulate, and analyze data</a:t>
+            </a:r>
+          </a:p>
+          <a:p>
+            <a:pPr>
+              <a:lnSpc>
+                <a:spcPct val="80000"/>
+              </a:lnSpc>
+              <a:spcBef>
+                <a:spcPts val="1200"/>
+              </a:spcBef>
+            </a:pPr>
+            <a:r>
+              <a:rPr lang="en-US" sz="2000" dirty="0" smtClean="0"/>
+              <a:t>Native support for complex (as well as simple) data types</a:t>
+            </a:r>
+          </a:p>
+          <a:p>
+            <a:pPr>
+              <a:lnSpc>
+                <a:spcPct val="80000"/>
+              </a:lnSpc>
+              <a:spcBef>
+                <a:spcPts val="1200"/>
+              </a:spcBef>
+            </a:pPr>
+            <a:r>
+              <a:rPr lang="en-US" sz="2000" dirty="0" smtClean="0"/>
+              <a:t>Derivable rows, columns and cells</a:t>
+            </a:r>
+          </a:p>
+          <a:p>
+            <a:pPr>
+              <a:lnSpc>
+                <a:spcPct val="80000"/>
+              </a:lnSpc>
+              <a:spcBef>
+                <a:spcPts val="1200"/>
+              </a:spcBef>
+            </a:pPr>
+            <a:r>
+              <a:rPr lang="en-US" sz="2000" dirty="0" smtClean="0"/>
+              <a:t>Support for compute-intensive/asynchronous derivations</a:t>
+            </a:r>
+          </a:p>
+          <a:p>
+            <a:pPr>
+              <a:lnSpc>
+                <a:spcPct val="80000"/>
+              </a:lnSpc>
+              <a:spcBef>
+                <a:spcPts val="1200"/>
+              </a:spcBef>
+            </a:pPr>
+            <a:r>
+              <a:rPr lang="en-US" sz="2000" dirty="0" smtClean="0"/>
+              <a:t>Robust </a:t>
+            </a:r>
+            <a:r>
+              <a:rPr lang="en-US" sz="2000" dirty="0"/>
+              <a:t>dependency </a:t>
+            </a:r>
+            <a:r>
+              <a:rPr lang="en-US" sz="2000" dirty="0" smtClean="0"/>
+              <a:t>engine</a:t>
+            </a:r>
+          </a:p>
+          <a:p>
+            <a:pPr>
+              <a:lnSpc>
+                <a:spcPct val="80000"/>
+              </a:lnSpc>
+              <a:spcBef>
+                <a:spcPts val="1200"/>
+              </a:spcBef>
+            </a:pPr>
+            <a:r>
+              <a:rPr lang="en-US" sz="2000" dirty="0" smtClean="0"/>
+              <a:t>Rational environment to develop </a:t>
+            </a:r>
+            <a:r>
+              <a:rPr lang="en-US" sz="2000" dirty="0" smtClean="0"/>
+              <a:t>extensions (“nibbles”)</a:t>
+            </a:r>
+            <a:endParaRPr lang="en-US" sz="2000" dirty="0"/>
+          </a:p>
+          <a:p>
+            <a:pPr>
+              <a:lnSpc>
+                <a:spcPct val="80000"/>
+              </a:lnSpc>
+              <a:spcBef>
+                <a:spcPts val="1200"/>
+              </a:spcBef>
+            </a:pPr>
+            <a:r>
+              <a:rPr lang="en-US" sz="2000" dirty="0" smtClean="0"/>
+              <a:t>Extensible operators and operator overloading:</a:t>
+            </a:r>
+          </a:p>
+          <a:p>
+            <a:pPr lvl="1">
+              <a:lnSpc>
+                <a:spcPct val="80000"/>
+              </a:lnSpc>
+              <a:spcBef>
+                <a:spcPts val="1200"/>
+              </a:spcBef>
+            </a:pPr>
+            <a:r>
+              <a:rPr lang="en-US" dirty="0"/>
+              <a:t>using </a:t>
+            </a:r>
             <a:r>
               <a:rPr lang="en-US" dirty="0" smtClean="0"/>
-              <a:t>A Development Framework for Modeling and Ad-Hoc Data Analysis Applications</a:t>
-            </a:r>
-          </a:p>
-          <a:p>
+              <a:t>Groovy &amp; Python/</a:t>
+            </a:r>
+            <a:r>
+              <a:rPr lang="en-US" dirty="0" err="1" smtClean="0"/>
+              <a:t>Jython</a:t>
+            </a:r>
+            <a:endParaRPr lang="en-US" dirty="0" smtClean="0"/>
+          </a:p>
+          <a:p>
+            <a:pPr lvl="1">
+              <a:lnSpc>
+                <a:spcPct val="80000"/>
+              </a:lnSpc>
+              <a:spcBef>
+                <a:spcPts val="1200"/>
+              </a:spcBef>
+            </a:pPr>
             <a:r>
               <a:rPr lang="en-US" dirty="0" smtClean="0"/>
-              <a:t>????</a:t>
-            </a:r>
-          </a:p>
-          <a:p>
-            <a:endParaRPr lang="en-US" dirty="0" smtClean="0"/>
-          </a:p>
-          <a:p>
-            <a:endParaRPr lang="en-US" dirty="0"/>
+              <a:t>using </a:t>
+            </a:r>
+            <a:r>
+              <a:rPr lang="en-US" dirty="0" smtClean="0"/>
+              <a:t>Java</a:t>
+            </a:r>
+          </a:p>
+          <a:p>
+            <a:pPr lvl="1">
+              <a:lnSpc>
+                <a:spcPct val="80000"/>
+              </a:lnSpc>
+              <a:spcBef>
+                <a:spcPts val="1200"/>
+              </a:spcBef>
+            </a:pPr>
+            <a:r>
+              <a:rPr lang="en-US" dirty="0" smtClean="0"/>
+              <a:t>using closures (lambda expressions)</a:t>
+            </a:r>
           </a:p>
         </p:txBody>
       </p:sp>
     </p:spTree>
     <p:extLst>
       <p:ext uri="{BB962C8B-B14F-4D97-AF65-F5344CB8AC3E}">
-        <p14:creationId xmlns:p14="http://schemas.microsoft.com/office/powerpoint/2010/main" val="4034642467"/>
+        <p14:creationId xmlns:p14="http://schemas.microsoft.com/office/powerpoint/2010/main" val="3224151931"/>
       </p:ext>
     </p:extLst>
   </p:cSld>
   <p:clrMapOvr>
     <a:masterClrMapping/>
   </p:clrMapOvr>
+  <p:timing>
+    <p:tnLst>
+      <p:par>
+        <p:cTn xmlns:p14="http://schemas.microsoft.com/office/powerpoint/2010/main" id="1" dur="indefinite" restart="never" nodeType="tmRoot"/>
+      </p:par>
+    </p:tnLst>
+  </p:timing>
 </p:sld>
 </file>
 
@@ -5704,7 +5765,7 @@
             <a:pPr algn="l"/>
             <a:r>
               <a:rPr lang="en-US" dirty="0" smtClean="0"/>
-              <a:t>TMS Applications</a:t>
+              <a:t>Sauces and Pickles</a:t>
             </a:r>
             <a:endParaRPr lang="en-US" dirty="0"/>
           </a:p>
@@ -5722,71 +5783,156 @@
         </p:nvSpPr>
         <p:spPr>
           <a:xfrm>
-            <a:off x="739775" y="2445855"/>
-            <a:ext cx="7662864" cy="3890322"/>
+            <a:off x="739775" y="2486384"/>
+            <a:ext cx="7662864" cy="3890323"/>
           </a:xfrm>
         </p:spPr>
         <p:txBody>
-          <a:bodyPr/>
-          <a:lstStyle/>
-          <a:p>
+          <a:bodyPr>
+            <a:normAutofit fontScale="92500" lnSpcReduction="20000"/>
+          </a:bodyPr>
+          <a:lstStyle/>
+          <a:p>
+            <a:pPr>
+              <a:lnSpc>
+                <a:spcPct val="90000"/>
+              </a:lnSpc>
+              <a:spcBef>
+                <a:spcPts val="1400"/>
+              </a:spcBef>
+            </a:pPr>
             <a:r>
               <a:rPr lang="en-US" dirty="0" smtClean="0"/>
-              <a:t>Heart of a modeling/ad-hoc data analysis application</a:t>
-            </a:r>
-          </a:p>
-          <a:p>
+              <a:t>Packaged with over 250 built-in operators</a:t>
+            </a:r>
+          </a:p>
+          <a:p>
+            <a:pPr>
+              <a:lnSpc>
+                <a:spcPct val="90000"/>
+              </a:lnSpc>
+              <a:spcBef>
+                <a:spcPts val="1400"/>
+              </a:spcBef>
+            </a:pPr>
+            <a:r>
+              <a:rPr lang="en-US" dirty="0"/>
+              <a:t>Integrated support for </a:t>
+            </a:r>
+            <a:r>
+              <a:rPr lang="en-US" dirty="0" err="1"/>
+              <a:t>RESTful</a:t>
+            </a:r>
+            <a:r>
+              <a:rPr lang="en-US" dirty="0"/>
+              <a:t> Web Services</a:t>
+            </a:r>
+          </a:p>
+          <a:p>
+            <a:pPr>
+              <a:lnSpc>
+                <a:spcPct val="90000"/>
+              </a:lnSpc>
+              <a:spcBef>
+                <a:spcPts val="1400"/>
+              </a:spcBef>
+            </a:pPr>
             <a:r>
               <a:rPr lang="en-US" dirty="0" smtClean="0"/>
-              <a:t>“Computed Fields” engine for </a:t>
-            </a:r>
-            <a:r>
-              <a:rPr lang="en-US" dirty="0" err="1" smtClean="0"/>
-              <a:t>SaaS</a:t>
-            </a:r>
+              <a:t>Feature-rich Excel integration (import and export, formulas)</a:t>
+            </a:r>
+          </a:p>
+          <a:p>
+            <a:pPr>
+              <a:lnSpc>
+                <a:spcPct val="90000"/>
+              </a:lnSpc>
+              <a:spcBef>
+                <a:spcPts val="1400"/>
+              </a:spcBef>
+            </a:pPr>
             <a:r>
               <a:rPr lang="en-US" dirty="0" smtClean="0"/>
-              <a:t> applications</a:t>
-            </a:r>
-          </a:p>
-          <a:p>
+              <a:t>PDF, HTML, and MS Word export</a:t>
+            </a:r>
+          </a:p>
+          <a:p>
+            <a:pPr>
+              <a:lnSpc>
+                <a:spcPct val="90000"/>
+              </a:lnSpc>
+              <a:spcBef>
+                <a:spcPts val="1400"/>
+              </a:spcBef>
+            </a:pPr>
             <a:r>
               <a:rPr lang="en-US" dirty="0" smtClean="0"/>
-              <a:t>Reporting/Excel Export environment for </a:t>
-            </a:r>
-            <a:r>
-              <a:rPr lang="en-US" dirty="0" err="1" smtClean="0"/>
-              <a:t>SaaS</a:t>
-            </a:r>
+              <a:t>IFS to PFS to IFS expression parsing &amp; generation; can translate formulas from one language to another</a:t>
+            </a:r>
+          </a:p>
+          <a:p>
+            <a:pPr>
+              <a:lnSpc>
+                <a:spcPct val="90000"/>
+              </a:lnSpc>
+              <a:spcBef>
+                <a:spcPts val="1400"/>
+              </a:spcBef>
+            </a:pPr>
             <a:r>
               <a:rPr lang="en-US" dirty="0" smtClean="0"/>
-              <a:t> applications</a:t>
-            </a:r>
-          </a:p>
-          <a:p>
-            <a:r>
-              <a:rPr lang="en-US" dirty="0" err="1" smtClean="0"/>
-              <a:t>IoT</a:t>
+              <a:t>Hybrid tables (</a:t>
             </a:r>
             <a:r>
               <a:rPr lang="en-US" dirty="0" smtClean="0"/>
-              <a:t> dashboard data aggregator</a:t>
-            </a:r>
-          </a:p>
-          <a:p>
+              <a:t>RDBMS, Log File </a:t>
+            </a:r>
             <a:r>
               <a:rPr lang="en-US" dirty="0" smtClean="0"/>
-              <a:t>Workbench for function/operator prototyping/development</a:t>
-            </a:r>
-          </a:p>
-          <a:p>
+              <a:t>integration)</a:t>
+            </a:r>
+          </a:p>
+          <a:p>
+            <a:pPr>
+              <a:lnSpc>
+                <a:spcPct val="90000"/>
+              </a:lnSpc>
+              <a:spcBef>
+                <a:spcPts val="1400"/>
+              </a:spcBef>
+            </a:pPr>
             <a:r>
               <a:rPr lang="en-US" dirty="0" smtClean="0"/>
-              <a:t>Workbench for REST-based API experimentation</a:t>
-            </a:r>
-          </a:p>
-          <a:p>
-            <a:endParaRPr lang="en-US" dirty="0" smtClean="0"/>
+              <a:t>Cell validation/transformation support</a:t>
+            </a:r>
+          </a:p>
+          <a:p>
+            <a:pPr>
+              <a:lnSpc>
+                <a:spcPct val="90000"/>
+              </a:lnSpc>
+              <a:spcBef>
+                <a:spcPts val="1400"/>
+              </a:spcBef>
+            </a:pPr>
+            <a:r>
+              <a:rPr lang="en-US" dirty="0" smtClean="0"/>
+              <a:t>Event listener support</a:t>
+            </a:r>
+          </a:p>
+          <a:p>
+            <a:pPr>
+              <a:lnSpc>
+                <a:spcPct val="90000"/>
+              </a:lnSpc>
+              <a:spcBef>
+                <a:spcPts val="1400"/>
+              </a:spcBef>
+            </a:pPr>
+            <a:r>
+              <a:rPr lang="en-US" dirty="0" smtClean="0"/>
+              <a:t>Tagging</a:t>
+            </a:r>
           </a:p>
           <a:p>
             <a:endParaRPr lang="en-US" dirty="0"/>
@@ -5796,13 +5942,20 @@
     </p:spTree>
     <p:extLst>
       <p:ext uri="{BB962C8B-B14F-4D97-AF65-F5344CB8AC3E}">
-        <p14:creationId xmlns:p14="http://schemas.microsoft.com/office/powerpoint/2010/main" val="3107410314"/>
+        <p14:creationId xmlns:p14="http://schemas.microsoft.com/office/powerpoint/2010/main" val="843770871"/>
       </p:ext>
     </p:extLst>
   </p:cSld>
   <p:clrMapOvr>
     <a:masterClrMapping/>
   </p:clrMapOvr>
+  <p:timing>
+    <p:tnLst>
+      <p:par>
+        <p:cTn xmlns:p14="http://schemas.microsoft.com/office/powerpoint/2010/main" id="1" dur="indefinite" restart="never" nodeType="tmRoot"/>
+      </p:par>
+    </p:tnLst>
+  </p:timing>
 </p:sld>
 </file>
 
@@ -5841,7 +5994,7 @@
             <a:pPr algn="l"/>
             <a:r>
               <a:rPr lang="en-US" dirty="0" smtClean="0"/>
-              <a:t>Architecture</a:t>
+              <a:t>TMS Applications</a:t>
             </a:r>
             <a:endParaRPr lang="en-US" dirty="0"/>
           </a:p>
@@ -5859,80 +6012,94 @@
         </p:nvSpPr>
         <p:spPr>
           <a:xfrm>
-            <a:off x="739775" y="2540425"/>
-            <a:ext cx="7662864" cy="3768732"/>
+            <a:off x="739775" y="2445855"/>
+            <a:ext cx="7662864" cy="3890322"/>
           </a:xfrm>
         </p:spPr>
         <p:txBody>
-          <a:bodyPr>
-            <a:normAutofit/>
-          </a:bodyPr>
+          <a:bodyPr/>
           <a:lstStyle/>
           <a:p>
             <a:r>
               <a:rPr lang="en-US" dirty="0" smtClean="0"/>
-              <a:t>Pure Java (JDK 1.8)</a:t>
-            </a:r>
-          </a:p>
-          <a:p>
+              <a:t>Heart of a modeling/ad-hoc data analysis application</a:t>
+            </a:r>
+          </a:p>
+          <a:p>
+            <a:r>
+              <a:rPr lang="en-US" dirty="0" smtClean="0"/>
+              <a:t>“Computed Fields” engine for </a:t>
+            </a:r>
             <a:r>
               <a:rPr lang="en-US" dirty="0" err="1" smtClean="0"/>
-              <a:t>Performant</a:t>
+              <a:t>SaaS</a:t>
             </a:r>
             <a:r>
               <a:rPr lang="en-US" dirty="0" smtClean="0"/>
-              <a:t> (sparse table cells, cell is 16 bytes)</a:t>
+              <a:t> applications</a:t>
             </a:r>
           </a:p>
           <a:p>
             <a:r>
               <a:rPr lang="en-US" dirty="0" smtClean="0"/>
-              <a:t>Interface-based API</a:t>
-            </a:r>
-          </a:p>
-          <a:p>
+              <a:t>Reporting/Excel Export environment for </a:t>
+            </a:r>
             <a:r>
               <a:rPr lang="en-US" dirty="0" err="1" smtClean="0"/>
-              <a:t>GitHub</a:t>
+              <a:t>SaaS</a:t>
             </a:r>
             <a:r>
               <a:rPr lang="en-US" dirty="0" smtClean="0"/>
-              <a:t> Repository &amp; Wiki</a:t>
+              <a:t> applications</a:t>
             </a:r>
           </a:p>
           <a:p>
             <a:r>
               <a:rPr lang="en-US" dirty="0" err="1" smtClean="0"/>
-              <a:t>Javadoc</a:t>
-            </a:r>
+              <a:t>IoT</a:t>
+            </a:r>
+            <a:r>
+              <a:rPr lang="en-US" dirty="0" smtClean="0"/>
+              <a:t> dashboard data aggregator</a:t>
+            </a:r>
+          </a:p>
+          <a:p>
+            <a:r>
+              <a:rPr lang="en-US" dirty="0" smtClean="0"/>
+              <a:t>Workbench for function/operator prototyping/development</a:t>
+            </a:r>
+          </a:p>
+          <a:p>
+            <a:r>
+              <a:rPr lang="en-US" dirty="0" smtClean="0"/>
+              <a:t>Workbench for REST-based API experimentation</a:t>
+            </a:r>
+          </a:p>
+          <a:p>
             <a:endParaRPr lang="en-US" dirty="0" smtClean="0"/>
           </a:p>
           <a:p>
-            <a:r>
-              <a:rPr lang="en-US" dirty="0" smtClean="0"/>
-              <a:t>Test-driven development (260 unit tests)</a:t>
-            </a:r>
-          </a:p>
-          <a:p>
-            <a:pPr lvl="1"/>
-            <a:r>
-              <a:rPr lang="en-US" dirty="0"/>
-              <a:t>34,000 lines of source code, 14,000 lines of unit test</a:t>
-            </a:r>
-            <a:endParaRPr lang="en-US" dirty="0" smtClean="0"/>
+            <a:endParaRPr lang="en-US" dirty="0"/>
           </a:p>
         </p:txBody>
       </p:sp>
     </p:spTree>
     <p:extLst>
       <p:ext uri="{BB962C8B-B14F-4D97-AF65-F5344CB8AC3E}">
-        <p14:creationId xmlns:p14="http://schemas.microsoft.com/office/powerpoint/2010/main" val="3647655822"/>
+        <p14:creationId xmlns:p14="http://schemas.microsoft.com/office/powerpoint/2010/main" val="3107410314"/>
       </p:ext>
     </p:extLst>
   </p:cSld>
   <p:clrMapOvr>
     <a:masterClrMapping/>
   </p:clrMapOvr>
+  <p:timing>
+    <p:tnLst>
+      <p:par>
+        <p:cTn xmlns:p14="http://schemas.microsoft.com/office/powerpoint/2010/main" id="1" dur="indefinite" restart="never" nodeType="tmRoot"/>
+      </p:par>
+    </p:tnLst>
+  </p:timing>
 </p:sld>
 </file>
 
@@ -5970,6 +6137,143 @@
           <a:p>
             <a:pPr algn="l"/>
             <a:r>
+              <a:rPr lang="en-US" dirty="0" smtClean="0"/>
+              <a:t>Architecture</a:t>
+            </a:r>
+            <a:endParaRPr lang="en-US" dirty="0"/>
+          </a:p>
+        </p:txBody>
+      </p:sp>
+      <p:sp>
+        <p:nvSpPr>
+          <p:cNvPr id="3" name="Content Placeholder 2"/>
+          <p:cNvSpPr>
+            <a:spLocks noGrp="1"/>
+          </p:cNvSpPr>
+          <p:nvPr>
+            <p:ph idx="1"/>
+          </p:nvPr>
+        </p:nvSpPr>
+        <p:spPr>
+          <a:xfrm>
+            <a:off x="739775" y="2540425"/>
+            <a:ext cx="7662864" cy="3768732"/>
+          </a:xfrm>
+        </p:spPr>
+        <p:txBody>
+          <a:bodyPr>
+            <a:normAutofit/>
+          </a:bodyPr>
+          <a:lstStyle/>
+          <a:p>
+            <a:r>
+              <a:rPr lang="en-US" dirty="0" smtClean="0"/>
+              <a:t>Pure Java (JDK 1.8)</a:t>
+            </a:r>
+          </a:p>
+          <a:p>
+            <a:r>
+              <a:rPr lang="en-US" dirty="0" err="1" smtClean="0"/>
+              <a:t>Performant</a:t>
+            </a:r>
+            <a:r>
+              <a:rPr lang="en-US" dirty="0" smtClean="0"/>
+              <a:t> (sparse table cells, cell is 16 bytes)</a:t>
+            </a:r>
+          </a:p>
+          <a:p>
+            <a:r>
+              <a:rPr lang="en-US" dirty="0" smtClean="0"/>
+              <a:t>Interface-based API</a:t>
+            </a:r>
+          </a:p>
+          <a:p>
+            <a:r>
+              <a:rPr lang="en-US" dirty="0" err="1" smtClean="0"/>
+              <a:t>GitHub</a:t>
+            </a:r>
+            <a:r>
+              <a:rPr lang="en-US" dirty="0" smtClean="0"/>
+              <a:t> Repository &amp; Wiki</a:t>
+            </a:r>
+          </a:p>
+          <a:p>
+            <a:r>
+              <a:rPr lang="en-US" dirty="0" err="1" smtClean="0"/>
+              <a:t>Javadoc</a:t>
+            </a:r>
+            <a:endParaRPr lang="en-US" dirty="0" smtClean="0"/>
+          </a:p>
+          <a:p>
+            <a:r>
+              <a:rPr lang="en-US" dirty="0" smtClean="0"/>
+              <a:t>Test-driven development (260 unit tests)</a:t>
+            </a:r>
+          </a:p>
+          <a:p>
+            <a:pPr lvl="1"/>
+            <a:r>
+              <a:rPr lang="en-US" dirty="0"/>
+              <a:t>34,000 lines of source code, 14,000 lines of unit test</a:t>
+            </a:r>
+            <a:endParaRPr lang="en-US" dirty="0" smtClean="0"/>
+          </a:p>
+        </p:txBody>
+      </p:sp>
+    </p:spTree>
+    <p:extLst>
+      <p:ext uri="{BB962C8B-B14F-4D97-AF65-F5344CB8AC3E}">
+        <p14:creationId xmlns:p14="http://schemas.microsoft.com/office/powerpoint/2010/main" val="3647655822"/>
+      </p:ext>
+    </p:extLst>
+  </p:cSld>
+  <p:clrMapOvr>
+    <a:masterClrMapping/>
+  </p:clrMapOvr>
+  <p:timing>
+    <p:tnLst>
+      <p:par>
+        <p:cTn xmlns:p14="http://schemas.microsoft.com/office/powerpoint/2010/main" id="1" dur="indefinite" restart="never" nodeType="tmRoot"/>
+      </p:par>
+    </p:tnLst>
+  </p:timing>
+</p:sld>
+</file>
+
+<file path=ppt/slides/slide8.xml><?xml version="1.0" encoding="utf-8"?>
+<p:sld xmlns:a="http://schemas.openxmlformats.org/drawingml/2006/main" xmlns:r="http://schemas.openxmlformats.org/officeDocument/2006/relationships" xmlns:p="http://schemas.openxmlformats.org/presentationml/2006/main">
+  <p:cSld>
+    <p:spTree>
+      <p:nvGrpSpPr>
+        <p:cNvPr id="1" name=""/>
+        <p:cNvGrpSpPr/>
+        <p:nvPr/>
+      </p:nvGrpSpPr>
+      <p:grpSpPr>
+        <a:xfrm>
+          <a:off x="0" y="0"/>
+          <a:ext cx="0" cy="0"/>
+          <a:chOff x="0" y="0"/>
+          <a:chExt cx="0" cy="0"/>
+        </a:xfrm>
+      </p:grpSpPr>
+      <p:sp>
+        <p:nvSpPr>
+          <p:cNvPr id="2" name="Title 1"/>
+          <p:cNvSpPr>
+            <a:spLocks noGrp="1"/>
+          </p:cNvSpPr>
+          <p:nvPr>
+            <p:ph type="title"/>
+          </p:nvPr>
+        </p:nvSpPr>
+        <p:spPr/>
+        <p:txBody>
+          <a:bodyPr/>
+          <a:lstStyle/>
+          <a:p>
+            <a:pPr algn="l"/>
+            <a:r>
               <a:rPr lang="en-US" dirty="0"/>
               <a:t>3</a:t>
             </a:r>
@@ -6053,6 +6357,13 @@
   <p:clrMapOvr>
     <a:masterClrMapping/>
   </p:clrMapOvr>
+  <p:timing>
+    <p:tnLst>
+      <p:par>
+        <p:cTn xmlns:p14="http://schemas.microsoft.com/office/powerpoint/2010/main" id="1" dur="indefinite" restart="never" nodeType="tmRoot"/>
+      </p:par>
+    </p:tnLst>
+  </p:timing>
 </p:sld>
 </file>
 

</xml_diff>

<commit_message>
Various Fixes: Issue with OnNoPendings event (logic was inverted) Improved table refresh (web client) Fixed serious issue in AsynchronousOp Reved Power Point
</commit_message>
<xml_diff>
--- a/doc/TMS Overview.pptx
+++ b/doc/TMS Overview.pptx
@@ -310,7 +310,7 @@
           <a:p>
             <a:fld id="{679BC7E7-EA8E-4DA7-915E-CC098D9BADCB}" type="datetimeFigureOut">
               <a:rPr lang="en-US" smtClean="0"/>
-              <a:t>12/21/15</a:t>
+              <a:t>1/13/16</a:t>
             </a:fld>
             <a:endParaRPr lang="en-US"/>
           </a:p>
@@ -439,7 +439,7 @@
           <a:p>
             <a:fld id="{679BC7E7-EA8E-4DA7-915E-CC098D9BADCB}" type="datetimeFigureOut">
               <a:rPr lang="en-US" smtClean="0"/>
-              <a:t>12/21/15</a:t>
+              <a:t>1/13/16</a:t>
             </a:fld>
             <a:endParaRPr lang="en-US"/>
           </a:p>
@@ -744,7 +744,7 @@
           <a:p>
             <a:fld id="{679BC7E7-EA8E-4DA7-915E-CC098D9BADCB}" type="datetimeFigureOut">
               <a:rPr lang="en-US" smtClean="0"/>
-              <a:t>12/21/15</a:t>
+              <a:t>1/13/16</a:t>
             </a:fld>
             <a:endParaRPr lang="en-US"/>
           </a:p>
@@ -969,7 +969,7 @@
           <a:p>
             <a:fld id="{679BC7E7-EA8E-4DA7-915E-CC098D9BADCB}" type="datetimeFigureOut">
               <a:rPr lang="en-US" smtClean="0"/>
-              <a:t>12/21/15</a:t>
+              <a:t>1/13/16</a:t>
             </a:fld>
             <a:endParaRPr lang="en-US"/>
           </a:p>
@@ -1239,7 +1239,7 @@
           <a:p>
             <a:fld id="{679BC7E7-EA8E-4DA7-915E-CC098D9BADCB}" type="datetimeFigureOut">
               <a:rPr lang="en-US" smtClean="0"/>
-              <a:t>12/21/15</a:t>
+              <a:t>1/13/16</a:t>
             </a:fld>
             <a:endParaRPr lang="en-US"/>
           </a:p>
@@ -1564,7 +1564,7 @@
           <a:p>
             <a:fld id="{679BC7E7-EA8E-4DA7-915E-CC098D9BADCB}" type="datetimeFigureOut">
               <a:rPr lang="en-US" smtClean="0"/>
-              <a:t>12/21/15</a:t>
+              <a:t>1/13/16</a:t>
             </a:fld>
             <a:endParaRPr lang="en-US"/>
           </a:p>
@@ -1757,7 +1757,7 @@
           <a:p>
             <a:fld id="{679BC7E7-EA8E-4DA7-915E-CC098D9BADCB}" type="datetimeFigureOut">
               <a:rPr lang="en-US" smtClean="0"/>
-              <a:t>12/21/15</a:t>
+              <a:t>1/13/16</a:t>
             </a:fld>
             <a:endParaRPr lang="en-US"/>
           </a:p>
@@ -1861,7 +1861,7 @@
           <a:p>
             <a:fld id="{679BC7E7-EA8E-4DA7-915E-CC098D9BADCB}" type="datetimeFigureOut">
               <a:rPr lang="en-US" smtClean="0"/>
-              <a:t>12/21/15</a:t>
+              <a:t>1/13/16</a:t>
             </a:fld>
             <a:endParaRPr lang="en-US"/>
           </a:p>
@@ -2030,7 +2030,7 @@
           <a:p>
             <a:fld id="{679BC7E7-EA8E-4DA7-915E-CC098D9BADCB}" type="datetimeFigureOut">
               <a:rPr lang="en-US" smtClean="0"/>
-              <a:t>12/21/15</a:t>
+              <a:t>1/13/16</a:t>
             </a:fld>
             <a:endParaRPr lang="en-US"/>
           </a:p>
@@ -2294,7 +2294,7 @@
           <a:p>
             <a:fld id="{679BC7E7-EA8E-4DA7-915E-CC098D9BADCB}" type="datetimeFigureOut">
               <a:rPr lang="en-US" smtClean="0"/>
-              <a:t>12/21/15</a:t>
+              <a:t>1/13/16</a:t>
             </a:fld>
             <a:endParaRPr lang="en-US"/>
           </a:p>
@@ -2628,7 +2628,7 @@
           <a:p>
             <a:fld id="{679BC7E7-EA8E-4DA7-915E-CC098D9BADCB}" type="datetimeFigureOut">
               <a:rPr lang="en-US" smtClean="0"/>
-              <a:t>12/21/15</a:t>
+              <a:t>1/13/16</a:t>
             </a:fld>
             <a:endParaRPr lang="en-US"/>
           </a:p>
@@ -3069,7 +3069,7 @@
           <a:p>
             <a:fld id="{679BC7E7-EA8E-4DA7-915E-CC098D9BADCB}" type="datetimeFigureOut">
               <a:rPr lang="en-US" smtClean="0"/>
-              <a:t>12/21/15</a:t>
+              <a:t>1/13/16</a:t>
             </a:fld>
             <a:endParaRPr lang="en-US"/>
           </a:p>
@@ -3267,7 +3267,7 @@
           <a:p>
             <a:fld id="{679BC7E7-EA8E-4DA7-915E-CC098D9BADCB}" type="datetimeFigureOut">
               <a:rPr lang="en-US" smtClean="0"/>
-              <a:t>12/21/15</a:t>
+              <a:t>1/13/16</a:t>
             </a:fld>
             <a:endParaRPr lang="en-US"/>
           </a:p>
@@ -3550,7 +3550,7 @@
           <a:p>
             <a:fld id="{679BC7E7-EA8E-4DA7-915E-CC098D9BADCB}" type="datetimeFigureOut">
               <a:rPr lang="en-US" smtClean="0"/>
-              <a:t>12/21/15</a:t>
+              <a:t>1/13/16</a:t>
             </a:fld>
             <a:endParaRPr lang="en-US"/>
           </a:p>
@@ -3918,7 +3918,7 @@
           <a:p>
             <a:fld id="{679BC7E7-EA8E-4DA7-915E-CC098D9BADCB}" type="datetimeFigureOut">
               <a:rPr lang="en-US" smtClean="0"/>
-              <a:t>12/21/15</a:t>
+              <a:t>1/13/16</a:t>
             </a:fld>
             <a:endParaRPr lang="en-US"/>
           </a:p>
@@ -4414,7 +4414,7 @@
           <a:p>
             <a:fld id="{679BC7E7-EA8E-4DA7-915E-CC098D9BADCB}" type="datetimeFigureOut">
               <a:rPr lang="en-US" smtClean="0"/>
-              <a:t>12/21/15</a:t>
+              <a:t>1/13/16</a:t>
             </a:fld>
             <a:endParaRPr lang="en-US"/>
           </a:p>
@@ -4623,7 +4623,7 @@
           <a:p>
             <a:fld id="{679BC7E7-EA8E-4DA7-915E-CC098D9BADCB}" type="datetimeFigureOut">
               <a:rPr lang="en-US" smtClean="0"/>
-              <a:t>12/21/15</a:t>
+              <a:t>1/13/16</a:t>
             </a:fld>
             <a:endParaRPr lang="en-US"/>
           </a:p>
@@ -5092,7 +5092,11 @@
           <a:p>
             <a:r>
               <a:rPr lang="en-US" dirty="0" smtClean="0"/>
-              <a:t>TMS</a:t>
+              <a:t>Consumable Data</a:t>
+            </a:r>
+            <a:r>
+              <a:rPr lang="en-US" dirty="0" smtClean="0"/>
+              <a:t/>
             </a:r>
             <a:br>
               <a:rPr lang="en-US" dirty="0" smtClean="0"/>
@@ -5247,7 +5251,6 @@
               <a:rPr lang="en-US" dirty="0" smtClean="0"/>
               <a:t>How do I “market/publicize” what I have?</a:t>
             </a:r>
-            <a:endParaRPr lang="en-US" dirty="0" smtClean="0"/>
           </a:p>
           <a:p>
             <a:pPr>
@@ -5276,7 +5279,6 @@
               <a:rPr lang="en-US" dirty="0" smtClean="0"/>
               <a:t>Alternate name: Consumable Data, serving up your data your way</a:t>
             </a:r>
-            <a:endParaRPr lang="en-US" dirty="0" smtClean="0"/>
           </a:p>
           <a:p>
             <a:pPr>
@@ -5346,7 +5348,11 @@
             <a:pPr algn="l"/>
             <a:r>
               <a:rPr lang="en-US" dirty="0" smtClean="0"/>
-              <a:t>What is TMS?</a:t>
+              <a:t>What is </a:t>
+            </a:r>
+            <a:r>
+              <a:rPr lang="en-US" dirty="0" smtClean="0"/>
+              <a:t>Consumable Data?</a:t>
             </a:r>
             <a:endParaRPr lang="en-US" dirty="0"/>
           </a:p>
@@ -5369,11 +5375,7 @@
           <a:p>
             <a:r>
               <a:rPr lang="en-US" dirty="0" smtClean="0"/>
-              <a:t>A </a:t>
-            </a:r>
-            <a:r>
-              <a:rPr lang="en-US" dirty="0" smtClean="0"/>
-              <a:t>development </a:t>
+              <a:t>A development </a:t>
             </a:r>
             <a:r>
               <a:rPr lang="en-US" dirty="0"/>
@@ -5381,19 +5383,7 @@
             </a:r>
             <a:r>
               <a:rPr lang="en-US" dirty="0" smtClean="0"/>
-              <a:t>ramework </a:t>
-            </a:r>
-            <a:r>
-              <a:rPr lang="en-US" dirty="0" smtClean="0"/>
-              <a:t>for </a:t>
-            </a:r>
-            <a:r>
-              <a:rPr lang="en-US" dirty="0" smtClean="0"/>
-              <a:t>modeling </a:t>
-            </a:r>
-            <a:r>
-              <a:rPr lang="en-US" dirty="0" smtClean="0"/>
-              <a:t>and </a:t>
+              <a:t>ramework for modeling and </a:t>
             </a:r>
             <a:r>
               <a:rPr lang="en-US" i="1" dirty="0" smtClean="0"/>
@@ -5420,12 +5410,22 @@
               <a:t>nalysis </a:t>
             </a:r>
             <a:r>
-              <a:rPr lang="en-US" dirty="0"/>
-              <a:t>a</a:t>
-            </a:r>
-            <a:r>
               <a:rPr lang="en-US" dirty="0" smtClean="0"/>
-              <a:t>pplications</a:t>
+              <a:t>applications</a:t>
+            </a:r>
+          </a:p>
+          <a:p>
+            <a:r>
+              <a:rPr lang="en-US" dirty="0" smtClean="0"/>
+              <a:t>A workbench to prototype/develop descriptors (</a:t>
+            </a:r>
+            <a:r>
+              <a:rPr lang="en-US" i="1" dirty="0" smtClean="0"/>
+              <a:t>nibbles</a:t>
+            </a:r>
+            <a:r>
+              <a:rPr lang="en-US" dirty="0" smtClean="0"/>
+              <a:t>)</a:t>
             </a:r>
             <a:endParaRPr lang="en-US" dirty="0" smtClean="0"/>
           </a:p>
@@ -5446,10 +5446,8 @@
           <a:p>
             <a:r>
               <a:rPr lang="en-US" dirty="0" smtClean="0"/>
-              <a:t>???</a:t>
-            </a:r>
-          </a:p>
-          <a:p>
+              <a:t>Others?</a:t>
+            </a:r>
             <a:endParaRPr lang="en-US" dirty="0" smtClean="0"/>
           </a:p>
           <a:p>
@@ -5635,7 +5633,11 @@
             </a:r>
             <a:r>
               <a:rPr lang="en-US" sz="2000" dirty="0" smtClean="0"/>
-              <a:t>extensions (“nibbles”)</a:t>
+              <a:t>descriptors (</a:t>
+            </a:r>
+            <a:r>
+              <a:rPr lang="en-US" sz="2000" dirty="0" smtClean="0"/>
+              <a:t>“nibbles”)</a:t>
             </a:r>
             <a:endParaRPr lang="en-US" sz="2000" dirty="0"/>
           </a:p>
@@ -5687,11 +5689,7 @@
             </a:pPr>
             <a:r>
               <a:rPr lang="en-US" dirty="0" smtClean="0"/>
-              <a:t>using </a:t>
-            </a:r>
-            <a:r>
-              <a:rPr lang="en-US" dirty="0" smtClean="0"/>
-              <a:t>Java</a:t>
+              <a:t>using Java</a:t>
             </a:r>
           </a:p>
           <a:p>
@@ -5838,8 +5836,12 @@
               </a:spcBef>
             </a:pPr>
             <a:r>
+              <a:rPr lang="en-US" dirty="0"/>
+              <a:t>Hybrid tables (RDBMS, Log File integration</a:t>
+            </a:r>
+            <a:r>
               <a:rPr lang="en-US" dirty="0" smtClean="0"/>
-              <a:t>Feature-rich Excel integration (import and export, formulas)</a:t>
+              <a:t>)</a:t>
             </a:r>
           </a:p>
           <a:p>
@@ -5853,7 +5855,11 @@
             </a:pPr>
             <a:r>
               <a:rPr lang="en-US" dirty="0" smtClean="0"/>
-              <a:t>PDF, HTML, and MS Word export</a:t>
+              <a:t>Feature</a:t>
+            </a:r>
+            <a:r>
+              <a:rPr lang="en-US" dirty="0" smtClean="0"/>
+              <a:t>-rich Excel integration (import and export, formulas)</a:t>
             </a:r>
           </a:p>
           <a:p>
@@ -5867,7 +5873,7 @@
             </a:pPr>
             <a:r>
               <a:rPr lang="en-US" dirty="0" smtClean="0"/>
-              <a:t>IFS to PFS to IFS expression parsing &amp; generation; can translate formulas from one language to another</a:t>
+              <a:t>PDF, HTML, and MS Word export</a:t>
             </a:r>
           </a:p>
           <a:p>
@@ -5881,16 +5887,13 @@
             </a:pPr>
             <a:r>
               <a:rPr lang="en-US" dirty="0" smtClean="0"/>
-              <a:t>Hybrid tables (</a:t>
+              <a:t>IFS to PFS to IFS expression parsing &amp; generation; can translate formulas from one language to </a:t>
             </a:r>
             <a:r>
               <a:rPr lang="en-US" dirty="0" smtClean="0"/>
-              <a:t>RDBMS, Log File </a:t>
-            </a:r>
-            <a:r>
-              <a:rPr lang="en-US" dirty="0" smtClean="0"/>
-              <a:t>integration)</a:t>
-            </a:r>
+              <a:t>another</a:t>
+            </a:r>
+            <a:endParaRPr lang="en-US" dirty="0" smtClean="0"/>
           </a:p>
           <a:p>
             <a:pPr>
@@ -5994,7 +5997,7 @@
             <a:pPr algn="l"/>
             <a:r>
               <a:rPr lang="en-US" dirty="0" smtClean="0"/>
-              <a:t>TMS Applications</a:t>
+              <a:t>Potential Use Cases</a:t>
             </a:r>
             <a:endParaRPr lang="en-US" dirty="0"/>
           </a:p>

</xml_diff>

<commit_message>
Checkpoint of Time Series development
</commit_message>
<xml_diff>
--- a/doc/TMS Overview.pptx
+++ b/doc/TMS Overview.pptx
@@ -8,11 +8,12 @@
     <p:sldId id="256" r:id="rId2"/>
     <p:sldId id="263" r:id="rId3"/>
     <p:sldId id="257" r:id="rId4"/>
-    <p:sldId id="258" r:id="rId5"/>
-    <p:sldId id="260" r:id="rId6"/>
-    <p:sldId id="262" r:id="rId7"/>
-    <p:sldId id="259" r:id="rId8"/>
-    <p:sldId id="261" r:id="rId9"/>
+    <p:sldId id="264" r:id="rId5"/>
+    <p:sldId id="258" r:id="rId6"/>
+    <p:sldId id="260" r:id="rId7"/>
+    <p:sldId id="262" r:id="rId8"/>
+    <p:sldId id="259" r:id="rId9"/>
+    <p:sldId id="261" r:id="rId10"/>
   </p:sldIdLst>
   <p:sldSz cx="9144000" cy="6858000" type="screen4x3"/>
   <p:notesSz cx="6858000" cy="9144000"/>
@@ -310,7 +311,7 @@
           <a:p>
             <a:fld id="{679BC7E7-EA8E-4DA7-915E-CC098D9BADCB}" type="datetimeFigureOut">
               <a:rPr lang="en-US" smtClean="0"/>
-              <a:t>1/13/16</a:t>
+              <a:t>3/21/16</a:t>
             </a:fld>
             <a:endParaRPr lang="en-US"/>
           </a:p>
@@ -439,7 +440,7 @@
           <a:p>
             <a:fld id="{679BC7E7-EA8E-4DA7-915E-CC098D9BADCB}" type="datetimeFigureOut">
               <a:rPr lang="en-US" smtClean="0"/>
-              <a:t>1/13/16</a:t>
+              <a:t>3/21/16</a:t>
             </a:fld>
             <a:endParaRPr lang="en-US"/>
           </a:p>
@@ -744,7 +745,7 @@
           <a:p>
             <a:fld id="{679BC7E7-EA8E-4DA7-915E-CC098D9BADCB}" type="datetimeFigureOut">
               <a:rPr lang="en-US" smtClean="0"/>
-              <a:t>1/13/16</a:t>
+              <a:t>3/21/16</a:t>
             </a:fld>
             <a:endParaRPr lang="en-US"/>
           </a:p>
@@ -969,7 +970,7 @@
           <a:p>
             <a:fld id="{679BC7E7-EA8E-4DA7-915E-CC098D9BADCB}" type="datetimeFigureOut">
               <a:rPr lang="en-US" smtClean="0"/>
-              <a:t>1/13/16</a:t>
+              <a:t>3/21/16</a:t>
             </a:fld>
             <a:endParaRPr lang="en-US"/>
           </a:p>
@@ -1239,7 +1240,7 @@
           <a:p>
             <a:fld id="{679BC7E7-EA8E-4DA7-915E-CC098D9BADCB}" type="datetimeFigureOut">
               <a:rPr lang="en-US" smtClean="0"/>
-              <a:t>1/13/16</a:t>
+              <a:t>3/21/16</a:t>
             </a:fld>
             <a:endParaRPr lang="en-US"/>
           </a:p>
@@ -1564,7 +1565,7 @@
           <a:p>
             <a:fld id="{679BC7E7-EA8E-4DA7-915E-CC098D9BADCB}" type="datetimeFigureOut">
               <a:rPr lang="en-US" smtClean="0"/>
-              <a:t>1/13/16</a:t>
+              <a:t>3/21/16</a:t>
             </a:fld>
             <a:endParaRPr lang="en-US"/>
           </a:p>
@@ -1757,7 +1758,7 @@
           <a:p>
             <a:fld id="{679BC7E7-EA8E-4DA7-915E-CC098D9BADCB}" type="datetimeFigureOut">
               <a:rPr lang="en-US" smtClean="0"/>
-              <a:t>1/13/16</a:t>
+              <a:t>3/21/16</a:t>
             </a:fld>
             <a:endParaRPr lang="en-US"/>
           </a:p>
@@ -1861,7 +1862,7 @@
           <a:p>
             <a:fld id="{679BC7E7-EA8E-4DA7-915E-CC098D9BADCB}" type="datetimeFigureOut">
               <a:rPr lang="en-US" smtClean="0"/>
-              <a:t>1/13/16</a:t>
+              <a:t>3/21/16</a:t>
             </a:fld>
             <a:endParaRPr lang="en-US"/>
           </a:p>
@@ -2030,7 +2031,7 @@
           <a:p>
             <a:fld id="{679BC7E7-EA8E-4DA7-915E-CC098D9BADCB}" type="datetimeFigureOut">
               <a:rPr lang="en-US" smtClean="0"/>
-              <a:t>1/13/16</a:t>
+              <a:t>3/21/16</a:t>
             </a:fld>
             <a:endParaRPr lang="en-US"/>
           </a:p>
@@ -2294,7 +2295,7 @@
           <a:p>
             <a:fld id="{679BC7E7-EA8E-4DA7-915E-CC098D9BADCB}" type="datetimeFigureOut">
               <a:rPr lang="en-US" smtClean="0"/>
-              <a:t>1/13/16</a:t>
+              <a:t>3/21/16</a:t>
             </a:fld>
             <a:endParaRPr lang="en-US"/>
           </a:p>
@@ -2628,7 +2629,7 @@
           <a:p>
             <a:fld id="{679BC7E7-EA8E-4DA7-915E-CC098D9BADCB}" type="datetimeFigureOut">
               <a:rPr lang="en-US" smtClean="0"/>
-              <a:t>1/13/16</a:t>
+              <a:t>3/21/16</a:t>
             </a:fld>
             <a:endParaRPr lang="en-US"/>
           </a:p>
@@ -3069,7 +3070,7 @@
           <a:p>
             <a:fld id="{679BC7E7-EA8E-4DA7-915E-CC098D9BADCB}" type="datetimeFigureOut">
               <a:rPr lang="en-US" smtClean="0"/>
-              <a:t>1/13/16</a:t>
+              <a:t>3/21/16</a:t>
             </a:fld>
             <a:endParaRPr lang="en-US"/>
           </a:p>
@@ -3267,7 +3268,7 @@
           <a:p>
             <a:fld id="{679BC7E7-EA8E-4DA7-915E-CC098D9BADCB}" type="datetimeFigureOut">
               <a:rPr lang="en-US" smtClean="0"/>
-              <a:t>1/13/16</a:t>
+              <a:t>3/21/16</a:t>
             </a:fld>
             <a:endParaRPr lang="en-US"/>
           </a:p>
@@ -3550,7 +3551,7 @@
           <a:p>
             <a:fld id="{679BC7E7-EA8E-4DA7-915E-CC098D9BADCB}" type="datetimeFigureOut">
               <a:rPr lang="en-US" smtClean="0"/>
-              <a:t>1/13/16</a:t>
+              <a:t>3/21/16</a:t>
             </a:fld>
             <a:endParaRPr lang="en-US"/>
           </a:p>
@@ -3918,7 +3919,7 @@
           <a:p>
             <a:fld id="{679BC7E7-EA8E-4DA7-915E-CC098D9BADCB}" type="datetimeFigureOut">
               <a:rPr lang="en-US" smtClean="0"/>
-              <a:t>1/13/16</a:t>
+              <a:t>3/21/16</a:t>
             </a:fld>
             <a:endParaRPr lang="en-US"/>
           </a:p>
@@ -4414,7 +4415,7 @@
           <a:p>
             <a:fld id="{679BC7E7-EA8E-4DA7-915E-CC098D9BADCB}" type="datetimeFigureOut">
               <a:rPr lang="en-US" smtClean="0"/>
-              <a:t>1/13/16</a:t>
+              <a:t>3/21/16</a:t>
             </a:fld>
             <a:endParaRPr lang="en-US"/>
           </a:p>
@@ -4623,7 +4624,7 @@
           <a:p>
             <a:fld id="{679BC7E7-EA8E-4DA7-915E-CC098D9BADCB}" type="datetimeFigureOut">
               <a:rPr lang="en-US" smtClean="0"/>
-              <a:t>1/13/16</a:t>
+              <a:t>3/21/16</a:t>
             </a:fld>
             <a:endParaRPr lang="en-US"/>
           </a:p>
@@ -5094,10 +5095,6 @@
               <a:rPr lang="en-US" dirty="0" smtClean="0"/>
               <a:t>Consumable Data</a:t>
             </a:r>
-            <a:r>
-              <a:rPr lang="en-US" dirty="0" smtClean="0"/>
-              <a:t/>
-            </a:r>
             <a:br>
               <a:rPr lang="en-US" dirty="0" smtClean="0"/>
             </a:br>
@@ -5348,11 +5345,7 @@
             <a:pPr algn="l"/>
             <a:r>
               <a:rPr lang="en-US" dirty="0" smtClean="0"/>
-              <a:t>What is </a:t>
-            </a:r>
-            <a:r>
-              <a:rPr lang="en-US" dirty="0" smtClean="0"/>
-              <a:t>Consumable Data?</a:t>
+              <a:t>What is Consumable Data?</a:t>
             </a:r>
             <a:endParaRPr lang="en-US" dirty="0"/>
           </a:p>
@@ -5407,11 +5400,7 @@
             </a:r>
             <a:r>
               <a:rPr lang="en-US" dirty="0" smtClean="0"/>
-              <a:t>nalysis </a:t>
-            </a:r>
-            <a:r>
-              <a:rPr lang="en-US" dirty="0" smtClean="0"/>
-              <a:t>applications</a:t>
+              <a:t>nalysis applications</a:t>
             </a:r>
           </a:p>
           <a:p>
@@ -5427,7 +5416,6 @@
               <a:rPr lang="en-US" dirty="0" smtClean="0"/>
               <a:t>)</a:t>
             </a:r>
-            <a:endParaRPr lang="en-US" dirty="0" smtClean="0"/>
           </a:p>
           <a:p>
             <a:r>
@@ -5448,7 +5436,6 @@
               <a:rPr lang="en-US" dirty="0" smtClean="0"/>
               <a:t>Others?</a:t>
             </a:r>
-            <a:endParaRPr lang="en-US" dirty="0" smtClean="0"/>
           </a:p>
           <a:p>
             <a:endParaRPr lang="en-US" dirty="0" smtClean="0"/>
@@ -5510,10 +5497,9 @@
           <a:bodyPr/>
           <a:lstStyle/>
           <a:p>
-            <a:pPr algn="l"/>
             <a:r>
               <a:rPr lang="en-US" dirty="0" smtClean="0"/>
-              <a:t>Key Features</a:t>
+              <a:t>The Data Pipeline</a:t>
             </a:r>
             <a:endParaRPr lang="en-US" dirty="0"/>
           </a:p>
@@ -5521,197 +5507,309 @@
       </p:sp>
       <p:sp>
         <p:nvSpPr>
-          <p:cNvPr id="3" name="Content Placeholder 2"/>
-          <p:cNvSpPr>
-            <a:spLocks noGrp="1"/>
-          </p:cNvSpPr>
-          <p:nvPr>
-            <p:ph idx="1"/>
-          </p:nvPr>
+          <p:cNvPr id="4" name="Pentagon 3"/>
+          <p:cNvSpPr/>
+          <p:nvPr/>
         </p:nvSpPr>
         <p:spPr>
           <a:xfrm>
-            <a:off x="457199" y="2513404"/>
-            <a:ext cx="8419945" cy="3971383"/>
+            <a:off x="368300" y="2832100"/>
+            <a:ext cx="2057400" cy="1066800"/>
           </a:xfrm>
+          <a:prstGeom prst="homePlate">
+            <a:avLst/>
+          </a:prstGeom>
         </p:spPr>
-        <p:txBody>
-          <a:bodyPr>
-            <a:normAutofit/>
+        <p:style>
+          <a:lnRef idx="1">
+            <a:schemeClr val="accent1"/>
+          </a:lnRef>
+          <a:fillRef idx="3">
+            <a:schemeClr val="accent1"/>
+          </a:fillRef>
+          <a:effectRef idx="2">
+            <a:schemeClr val="accent1"/>
+          </a:effectRef>
+          <a:fontRef idx="minor">
+            <a:schemeClr val="lt1"/>
+          </a:fontRef>
+        </p:style>
+        <p:txBody>
+          <a:bodyPr rtlCol="0" anchor="ctr"/>
+          <a:lstStyle/>
+          <a:p>
+            <a:pPr algn="ctr"/>
+            <a:r>
+              <a:rPr lang="en-US" sz="1600" dirty="0" smtClean="0">
+                <a:solidFill>
+                  <a:schemeClr val="tx1"/>
+                </a:solidFill>
+                <a:latin typeface="Chalkboard SE"/>
+              </a:rPr>
+              <a:t>Data Collection</a:t>
+            </a:r>
+            <a:endParaRPr lang="en-US" sz="1600" dirty="0">
+              <a:solidFill>
+                <a:schemeClr val="tx1"/>
+              </a:solidFill>
+              <a:latin typeface="Chalkboard SE"/>
+            </a:endParaRPr>
+          </a:p>
+        </p:txBody>
+      </p:sp>
+      <p:sp>
+        <p:nvSpPr>
+          <p:cNvPr id="5" name="Chevron 4"/>
+          <p:cNvSpPr/>
+          <p:nvPr/>
+        </p:nvSpPr>
+        <p:spPr>
+          <a:xfrm>
+            <a:off x="2159000" y="2832100"/>
+            <a:ext cx="2286000" cy="1066800"/>
+          </a:xfrm>
+          <a:prstGeom prst="chevron">
+            <a:avLst/>
+          </a:prstGeom>
+        </p:spPr>
+        <p:style>
+          <a:lnRef idx="1">
+            <a:schemeClr val="accent1"/>
+          </a:lnRef>
+          <a:fillRef idx="3">
+            <a:schemeClr val="accent1"/>
+          </a:fillRef>
+          <a:effectRef idx="2">
+            <a:schemeClr val="accent1"/>
+          </a:effectRef>
+          <a:fontRef idx="minor">
+            <a:schemeClr val="lt1"/>
+          </a:fontRef>
+        </p:style>
+        <p:txBody>
+          <a:bodyPr lIns="0" rIns="0" rtlCol="0" anchor="ctr"/>
+          <a:lstStyle/>
+          <a:p>
+            <a:pPr algn="ctr"/>
+            <a:r>
+              <a:rPr lang="en-US" sz="1600" dirty="0" smtClean="0">
+                <a:solidFill>
+                  <a:schemeClr val="tx1"/>
+                </a:solidFill>
+                <a:latin typeface="Chalkboard SE Bold"/>
+                <a:cs typeface="Chalkboard SE Bold"/>
+              </a:rPr>
+              <a:t>Data Manipulation</a:t>
+            </a:r>
+            <a:endParaRPr lang="en-US" sz="1600" dirty="0">
+              <a:solidFill>
+                <a:schemeClr val="tx1"/>
+              </a:solidFill>
+              <a:latin typeface="Chalkboard SE Bold"/>
+              <a:cs typeface="Chalkboard SE Bold"/>
+            </a:endParaRPr>
+          </a:p>
+        </p:txBody>
+      </p:sp>
+      <p:sp>
+        <p:nvSpPr>
+          <p:cNvPr id="6" name="Chevron 5"/>
+          <p:cNvSpPr/>
+          <p:nvPr/>
+        </p:nvSpPr>
+        <p:spPr>
+          <a:xfrm>
+            <a:off x="4191000" y="2832100"/>
+            <a:ext cx="2286000" cy="1066800"/>
+          </a:xfrm>
+          <a:prstGeom prst="chevron">
+            <a:avLst/>
+          </a:prstGeom>
+        </p:spPr>
+        <p:style>
+          <a:lnRef idx="1">
+            <a:schemeClr val="accent1"/>
+          </a:lnRef>
+          <a:fillRef idx="3">
+            <a:schemeClr val="accent1"/>
+          </a:fillRef>
+          <a:effectRef idx="2">
+            <a:schemeClr val="accent1"/>
+          </a:effectRef>
+          <a:fontRef idx="minor">
+            <a:schemeClr val="lt1"/>
+          </a:fontRef>
+        </p:style>
+        <p:txBody>
+          <a:bodyPr lIns="0" rIns="0" rtlCol="0" anchor="ctr"/>
+          <a:lstStyle/>
+          <a:p>
+            <a:pPr algn="ctr"/>
+            <a:r>
+              <a:rPr lang="en-US" sz="1600" dirty="0" smtClean="0">
+                <a:solidFill>
+                  <a:schemeClr val="tx1"/>
+                </a:solidFill>
+                <a:latin typeface="Chalkboard SE Bold"/>
+                <a:cs typeface="Chalkboard SE Bold"/>
+              </a:rPr>
+              <a:t>Data Analysis</a:t>
+            </a:r>
+            <a:endParaRPr lang="en-US" sz="1600" dirty="0">
+              <a:solidFill>
+                <a:schemeClr val="tx1"/>
+              </a:solidFill>
+              <a:latin typeface="Chalkboard SE Bold"/>
+              <a:cs typeface="Chalkboard SE Bold"/>
+            </a:endParaRPr>
+          </a:p>
+        </p:txBody>
+      </p:sp>
+      <p:sp>
+        <p:nvSpPr>
+          <p:cNvPr id="7" name="Chevron 6"/>
+          <p:cNvSpPr/>
+          <p:nvPr/>
+        </p:nvSpPr>
+        <p:spPr>
+          <a:xfrm>
+            <a:off x="6223000" y="2832100"/>
+            <a:ext cx="2286000" cy="1066800"/>
+          </a:xfrm>
+          <a:prstGeom prst="chevron">
+            <a:avLst/>
+          </a:prstGeom>
+        </p:spPr>
+        <p:style>
+          <a:lnRef idx="1">
+            <a:schemeClr val="accent1"/>
+          </a:lnRef>
+          <a:fillRef idx="3">
+            <a:schemeClr val="accent1"/>
+          </a:fillRef>
+          <a:effectRef idx="2">
+            <a:schemeClr val="accent1"/>
+          </a:effectRef>
+          <a:fontRef idx="minor">
+            <a:schemeClr val="lt1"/>
+          </a:fontRef>
+        </p:style>
+        <p:txBody>
+          <a:bodyPr lIns="0" rIns="0" rtlCol="0" anchor="ctr"/>
+          <a:lstStyle/>
+          <a:p>
+            <a:pPr algn="ctr"/>
+            <a:r>
+              <a:rPr lang="en-US" sz="1600" dirty="0" smtClean="0">
+                <a:solidFill>
+                  <a:schemeClr val="tx1"/>
+                </a:solidFill>
+                <a:latin typeface="Chalkboard SE Bold"/>
+                <a:cs typeface="Chalkboard SE Bold"/>
+              </a:rPr>
+              <a:t>Data Visualization</a:t>
+            </a:r>
+            <a:endParaRPr lang="en-US" sz="1600" dirty="0">
+              <a:solidFill>
+                <a:schemeClr val="tx1"/>
+              </a:solidFill>
+              <a:latin typeface="Chalkboard SE Bold"/>
+              <a:cs typeface="Chalkboard SE Bold"/>
+            </a:endParaRPr>
+          </a:p>
+        </p:txBody>
+      </p:sp>
+      <p:sp>
+        <p:nvSpPr>
+          <p:cNvPr id="8" name="Left Brace 7"/>
+          <p:cNvSpPr/>
+          <p:nvPr/>
+        </p:nvSpPr>
+        <p:spPr>
+          <a:xfrm rot="16200000">
+            <a:off x="2717800" y="2838450"/>
+            <a:ext cx="508000" cy="3479800"/>
+          </a:xfrm>
+          <a:prstGeom prst="leftBrace">
+            <a:avLst/>
+          </a:prstGeom>
+        </p:spPr>
+        <p:style>
+          <a:lnRef idx="2">
+            <a:schemeClr val="accent1"/>
+          </a:lnRef>
+          <a:fillRef idx="0">
+            <a:schemeClr val="accent1"/>
+          </a:fillRef>
+          <a:effectRef idx="1">
+            <a:schemeClr val="accent1"/>
+          </a:effectRef>
+          <a:fontRef idx="minor">
+            <a:schemeClr val="tx1"/>
+          </a:fontRef>
+        </p:style>
+        <p:txBody>
+          <a:bodyPr rtlCol="0" anchor="ctr"/>
+          <a:lstStyle/>
+          <a:p>
+            <a:pPr algn="ctr"/>
+            <a:endParaRPr lang="en-US">
+              <a:ln w="38100" cmpd="sng">
+                <a:solidFill>
+                  <a:srgbClr val="000000"/>
+                </a:solidFill>
+              </a:ln>
+            </a:endParaRPr>
+          </a:p>
+        </p:txBody>
+      </p:sp>
+      <p:sp>
+        <p:nvSpPr>
+          <p:cNvPr id="9" name="TextBox 8"/>
+          <p:cNvSpPr txBox="1"/>
+          <p:nvPr/>
+        </p:nvSpPr>
+        <p:spPr>
+          <a:xfrm>
+            <a:off x="1625600" y="4914900"/>
+            <a:ext cx="2705100" cy="461665"/>
+          </a:xfrm>
+          <a:prstGeom prst="rect">
+            <a:avLst/>
+          </a:prstGeom>
+          <a:noFill/>
+        </p:spPr>
+        <p:txBody>
+          <a:bodyPr wrap="square" rtlCol="0">
+            <a:spAutoFit/>
           </a:bodyPr>
           <a:lstStyle/>
           <a:p>
-            <a:pPr>
-              <a:lnSpc>
-                <a:spcPct val="80000"/>
-              </a:lnSpc>
-              <a:spcBef>
-                <a:spcPts val="1200"/>
-              </a:spcBef>
-            </a:pPr>
-            <a:r>
-              <a:rPr lang="en-US" sz="2000" dirty="0" smtClean="0"/>
-              <a:t>Familiar tabular environment to manage, manipulate, and analyze data</a:t>
-            </a:r>
-          </a:p>
-          <a:p>
-            <a:pPr>
-              <a:lnSpc>
-                <a:spcPct val="80000"/>
-              </a:lnSpc>
-              <a:spcBef>
-                <a:spcPts val="1200"/>
-              </a:spcBef>
-            </a:pPr>
-            <a:r>
-              <a:rPr lang="en-US" sz="2000" dirty="0" smtClean="0"/>
-              <a:t>Native support for complex (as well as simple) data types</a:t>
-            </a:r>
-          </a:p>
-          <a:p>
-            <a:pPr>
-              <a:lnSpc>
-                <a:spcPct val="80000"/>
-              </a:lnSpc>
-              <a:spcBef>
-                <a:spcPts val="1200"/>
-              </a:spcBef>
-            </a:pPr>
-            <a:r>
-              <a:rPr lang="en-US" sz="2000" dirty="0" smtClean="0"/>
-              <a:t>Derivable rows, columns and cells</a:t>
-            </a:r>
-          </a:p>
-          <a:p>
-            <a:pPr>
-              <a:lnSpc>
-                <a:spcPct val="80000"/>
-              </a:lnSpc>
-              <a:spcBef>
-                <a:spcPts val="1200"/>
-              </a:spcBef>
-            </a:pPr>
-            <a:r>
-              <a:rPr lang="en-US" sz="2000" dirty="0" smtClean="0"/>
-              <a:t>Support for compute-intensive/asynchronous derivations</a:t>
-            </a:r>
-          </a:p>
-          <a:p>
-            <a:pPr>
-              <a:lnSpc>
-                <a:spcPct val="80000"/>
-              </a:lnSpc>
-              <a:spcBef>
-                <a:spcPts val="1200"/>
-              </a:spcBef>
-            </a:pPr>
-            <a:r>
-              <a:rPr lang="en-US" sz="2000" dirty="0" smtClean="0"/>
-              <a:t>Robust </a:t>
-            </a:r>
-            <a:r>
-              <a:rPr lang="en-US" sz="2000" dirty="0"/>
-              <a:t>dependency </a:t>
-            </a:r>
-            <a:r>
-              <a:rPr lang="en-US" sz="2000" dirty="0" smtClean="0"/>
-              <a:t>engine</a:t>
-            </a:r>
-          </a:p>
-          <a:p>
-            <a:pPr>
-              <a:lnSpc>
-                <a:spcPct val="80000"/>
-              </a:lnSpc>
-              <a:spcBef>
-                <a:spcPts val="1200"/>
-              </a:spcBef>
-            </a:pPr>
-            <a:r>
-              <a:rPr lang="en-US" sz="2000" dirty="0" smtClean="0"/>
-              <a:t>Rational environment to develop </a:t>
-            </a:r>
-            <a:r>
-              <a:rPr lang="en-US" sz="2000" dirty="0" smtClean="0"/>
-              <a:t>descriptors (</a:t>
-            </a:r>
-            <a:r>
-              <a:rPr lang="en-US" sz="2000" dirty="0" smtClean="0"/>
-              <a:t>“nibbles”)</a:t>
-            </a:r>
-            <a:endParaRPr lang="en-US" sz="2000" dirty="0"/>
-          </a:p>
-          <a:p>
-            <a:pPr>
-              <a:lnSpc>
-                <a:spcPct val="80000"/>
-              </a:lnSpc>
-              <a:spcBef>
-                <a:spcPts val="1200"/>
-              </a:spcBef>
-            </a:pPr>
-            <a:r>
-              <a:rPr lang="en-US" sz="2000" dirty="0" smtClean="0"/>
-              <a:t>Extensible operators and operator overloading:</a:t>
-            </a:r>
-          </a:p>
-          <a:p>
-            <a:pPr lvl="1">
-              <a:lnSpc>
-                <a:spcPct val="80000"/>
-              </a:lnSpc>
-              <a:spcBef>
-                <a:spcPts val="1200"/>
-              </a:spcBef>
-            </a:pPr>
-            <a:r>
-              <a:rPr lang="en-US" dirty="0"/>
-              <a:t>using </a:t>
-            </a:r>
-            <a:r>
-              <a:rPr lang="en-US" dirty="0" smtClean="0"/>
-              <a:t>Groovy &amp; Python/</a:t>
-            </a:r>
-            <a:r>
-              <a:rPr lang="en-US" dirty="0" err="1" smtClean="0"/>
-              <a:t>Jython</a:t>
-            </a:r>
-            <a:endParaRPr lang="en-US" dirty="0" smtClean="0"/>
-          </a:p>
-          <a:p>
-            <a:pPr lvl="1">
-              <a:lnSpc>
-                <a:spcPct val="80000"/>
-              </a:lnSpc>
-              <a:spcBef>
-                <a:spcPts val="1200"/>
-              </a:spcBef>
-            </a:pPr>
-            <a:r>
-              <a:rPr lang="en-US" dirty="0" smtClean="0"/>
-              <a:t>using Java</a:t>
-            </a:r>
-          </a:p>
-          <a:p>
-            <a:pPr lvl="1">
-              <a:lnSpc>
-                <a:spcPct val="80000"/>
-              </a:lnSpc>
-              <a:spcBef>
-                <a:spcPts val="1200"/>
-              </a:spcBef>
-            </a:pPr>
-            <a:r>
-              <a:rPr lang="en-US" dirty="0" smtClean="0"/>
-              <a:t>using closures (lambda expressions)</a:t>
-            </a:r>
+            <a:pPr algn="ctr"/>
+            <a:r>
+              <a:rPr lang="en-US" sz="2400" dirty="0" smtClean="0">
+                <a:solidFill>
+                  <a:srgbClr val="008000"/>
+                </a:solidFill>
+                <a:latin typeface="Chalkboard SE Bold"/>
+                <a:cs typeface="Chalkboard SE Bold"/>
+              </a:rPr>
+              <a:t>Consumable Data</a:t>
+            </a:r>
+            <a:endParaRPr lang="en-US" sz="2400" dirty="0">
+              <a:solidFill>
+                <a:srgbClr val="008000"/>
+              </a:solidFill>
+              <a:latin typeface="Chalkboard SE Bold"/>
+              <a:cs typeface="Chalkboard SE Bold"/>
+            </a:endParaRPr>
           </a:p>
         </p:txBody>
       </p:sp>
     </p:spTree>
     <p:extLst>
       <p:ext uri="{BB962C8B-B14F-4D97-AF65-F5344CB8AC3E}">
-        <p14:creationId xmlns:p14="http://schemas.microsoft.com/office/powerpoint/2010/main" val="3224151931"/>
+        <p14:creationId xmlns:p14="http://schemas.microsoft.com/office/powerpoint/2010/main" val="1082997927"/>
       </p:ext>
     </p:extLst>
   </p:cSld>
@@ -5721,9 +5819,292 @@
   <p:timing>
     <p:tnLst>
       <p:par>
-        <p:cTn xmlns:p14="http://schemas.microsoft.com/office/powerpoint/2010/main" id="1" dur="indefinite" restart="never" nodeType="tmRoot"/>
+        <p:cTn xmlns:p14="http://schemas.microsoft.com/office/powerpoint/2010/main" id="1" dur="indefinite" restart="never" nodeType="tmRoot">
+          <p:childTnLst>
+            <p:seq concurrent="1" nextAc="seek">
+              <p:cTn id="2" dur="indefinite" nodeType="mainSeq">
+                <p:childTnLst>
+                  <p:par>
+                    <p:cTn id="3" fill="hold">
+                      <p:stCondLst>
+                        <p:cond delay="indefinite"/>
+                      </p:stCondLst>
+                      <p:childTnLst>
+                        <p:par>
+                          <p:cTn id="4" fill="hold">
+                            <p:stCondLst>
+                              <p:cond delay="0"/>
+                            </p:stCondLst>
+                            <p:childTnLst>
+                              <p:par>
+                                <p:cTn id="5" presetID="1" presetClass="entr" presetSubtype="0" fill="hold" grpId="0" nodeType="clickEffect">
+                                  <p:stCondLst>
+                                    <p:cond delay="0"/>
+                                  </p:stCondLst>
+                                  <p:childTnLst>
+                                    <p:set>
+                                      <p:cBhvr>
+                                        <p:cTn id="6" dur="1" fill="hold">
+                                          <p:stCondLst>
+                                            <p:cond delay="0"/>
+                                          </p:stCondLst>
+                                        </p:cTn>
+                                        <p:tgtEl>
+                                          <p:spTgt spid="4"/>
+                                        </p:tgtEl>
+                                        <p:attrNameLst>
+                                          <p:attrName>style.visibility</p:attrName>
+                                        </p:attrNameLst>
+                                      </p:cBhvr>
+                                      <p:to>
+                                        <p:strVal val="visible"/>
+                                      </p:to>
+                                    </p:set>
+                                  </p:childTnLst>
+                                </p:cTn>
+                              </p:par>
+                            </p:childTnLst>
+                          </p:cTn>
+                        </p:par>
+                      </p:childTnLst>
+                    </p:cTn>
+                  </p:par>
+                  <p:par>
+                    <p:cTn id="7" fill="hold">
+                      <p:stCondLst>
+                        <p:cond delay="indefinite"/>
+                      </p:stCondLst>
+                      <p:childTnLst>
+                        <p:par>
+                          <p:cTn id="8" fill="hold">
+                            <p:stCondLst>
+                              <p:cond delay="0"/>
+                            </p:stCondLst>
+                            <p:childTnLst>
+                              <p:par>
+                                <p:cTn id="9" presetID="1" presetClass="entr" presetSubtype="0" fill="hold" grpId="0" nodeType="clickEffect">
+                                  <p:stCondLst>
+                                    <p:cond delay="0"/>
+                                  </p:stCondLst>
+                                  <p:childTnLst>
+                                    <p:set>
+                                      <p:cBhvr>
+                                        <p:cTn id="10" dur="1" fill="hold">
+                                          <p:stCondLst>
+                                            <p:cond delay="0"/>
+                                          </p:stCondLst>
+                                        </p:cTn>
+                                        <p:tgtEl>
+                                          <p:spTgt spid="5"/>
+                                        </p:tgtEl>
+                                        <p:attrNameLst>
+                                          <p:attrName>style.visibility</p:attrName>
+                                        </p:attrNameLst>
+                                      </p:cBhvr>
+                                      <p:to>
+                                        <p:strVal val="visible"/>
+                                      </p:to>
+                                    </p:set>
+                                  </p:childTnLst>
+                                </p:cTn>
+                              </p:par>
+                            </p:childTnLst>
+                          </p:cTn>
+                        </p:par>
+                      </p:childTnLst>
+                    </p:cTn>
+                  </p:par>
+                  <p:par>
+                    <p:cTn id="11" fill="hold">
+                      <p:stCondLst>
+                        <p:cond delay="indefinite"/>
+                      </p:stCondLst>
+                      <p:childTnLst>
+                        <p:par>
+                          <p:cTn id="12" fill="hold">
+                            <p:stCondLst>
+                              <p:cond delay="0"/>
+                            </p:stCondLst>
+                            <p:childTnLst>
+                              <p:par>
+                                <p:cTn id="13" presetID="1" presetClass="entr" presetSubtype="0" fill="hold" grpId="0" nodeType="clickEffect">
+                                  <p:stCondLst>
+                                    <p:cond delay="0"/>
+                                  </p:stCondLst>
+                                  <p:childTnLst>
+                                    <p:set>
+                                      <p:cBhvr>
+                                        <p:cTn id="14" dur="1" fill="hold">
+                                          <p:stCondLst>
+                                            <p:cond delay="0"/>
+                                          </p:stCondLst>
+                                        </p:cTn>
+                                        <p:tgtEl>
+                                          <p:spTgt spid="6"/>
+                                        </p:tgtEl>
+                                        <p:attrNameLst>
+                                          <p:attrName>style.visibility</p:attrName>
+                                        </p:attrNameLst>
+                                      </p:cBhvr>
+                                      <p:to>
+                                        <p:strVal val="visible"/>
+                                      </p:to>
+                                    </p:set>
+                                  </p:childTnLst>
+                                </p:cTn>
+                              </p:par>
+                            </p:childTnLst>
+                          </p:cTn>
+                        </p:par>
+                      </p:childTnLst>
+                    </p:cTn>
+                  </p:par>
+                  <p:par>
+                    <p:cTn id="15" fill="hold">
+                      <p:stCondLst>
+                        <p:cond delay="indefinite"/>
+                      </p:stCondLst>
+                      <p:childTnLst>
+                        <p:par>
+                          <p:cTn id="16" fill="hold">
+                            <p:stCondLst>
+                              <p:cond delay="0"/>
+                            </p:stCondLst>
+                            <p:childTnLst>
+                              <p:par>
+                                <p:cTn id="17" presetID="1" presetClass="entr" presetSubtype="0" fill="hold" grpId="0" nodeType="clickEffect">
+                                  <p:stCondLst>
+                                    <p:cond delay="0"/>
+                                  </p:stCondLst>
+                                  <p:childTnLst>
+                                    <p:set>
+                                      <p:cBhvr>
+                                        <p:cTn id="18" dur="1" fill="hold">
+                                          <p:stCondLst>
+                                            <p:cond delay="0"/>
+                                          </p:stCondLst>
+                                        </p:cTn>
+                                        <p:tgtEl>
+                                          <p:spTgt spid="7"/>
+                                        </p:tgtEl>
+                                        <p:attrNameLst>
+                                          <p:attrName>style.visibility</p:attrName>
+                                        </p:attrNameLst>
+                                      </p:cBhvr>
+                                      <p:to>
+                                        <p:strVal val="visible"/>
+                                      </p:to>
+                                    </p:set>
+                                  </p:childTnLst>
+                                </p:cTn>
+                              </p:par>
+                            </p:childTnLst>
+                          </p:cTn>
+                        </p:par>
+                      </p:childTnLst>
+                    </p:cTn>
+                  </p:par>
+                  <p:par>
+                    <p:cTn id="19" fill="hold">
+                      <p:stCondLst>
+                        <p:cond delay="indefinite"/>
+                      </p:stCondLst>
+                      <p:childTnLst>
+                        <p:par>
+                          <p:cTn id="20" fill="hold">
+                            <p:stCondLst>
+                              <p:cond delay="0"/>
+                            </p:stCondLst>
+                            <p:childTnLst>
+                              <p:par>
+                                <p:cTn id="21" presetID="1" presetClass="entr" presetSubtype="0" fill="hold" grpId="0" nodeType="clickEffect">
+                                  <p:stCondLst>
+                                    <p:cond delay="0"/>
+                                  </p:stCondLst>
+                                  <p:childTnLst>
+                                    <p:set>
+                                      <p:cBhvr>
+                                        <p:cTn id="22" dur="1" fill="hold">
+                                          <p:stCondLst>
+                                            <p:cond delay="0"/>
+                                          </p:stCondLst>
+                                        </p:cTn>
+                                        <p:tgtEl>
+                                          <p:spTgt spid="8"/>
+                                        </p:tgtEl>
+                                        <p:attrNameLst>
+                                          <p:attrName>style.visibility</p:attrName>
+                                        </p:attrNameLst>
+                                      </p:cBhvr>
+                                      <p:to>
+                                        <p:strVal val="visible"/>
+                                      </p:to>
+                                    </p:set>
+                                  </p:childTnLst>
+                                </p:cTn>
+                              </p:par>
+                              <p:par>
+                                <p:cTn id="23" presetID="1" presetClass="entr" presetSubtype="0" fill="hold" grpId="0" nodeType="withEffect">
+                                  <p:stCondLst>
+                                    <p:cond delay="0"/>
+                                  </p:stCondLst>
+                                  <p:childTnLst>
+                                    <p:set>
+                                      <p:cBhvr>
+                                        <p:cTn id="24" dur="1" fill="hold">
+                                          <p:stCondLst>
+                                            <p:cond delay="0"/>
+                                          </p:stCondLst>
+                                        </p:cTn>
+                                        <p:tgtEl>
+                                          <p:spTgt spid="9"/>
+                                        </p:tgtEl>
+                                        <p:attrNameLst>
+                                          <p:attrName>style.visibility</p:attrName>
+                                        </p:attrNameLst>
+                                      </p:cBhvr>
+                                      <p:to>
+                                        <p:strVal val="visible"/>
+                                      </p:to>
+                                    </p:set>
+                                  </p:childTnLst>
+                                </p:cTn>
+                              </p:par>
+                            </p:childTnLst>
+                          </p:cTn>
+                        </p:par>
+                      </p:childTnLst>
+                    </p:cTn>
+                  </p:par>
+                </p:childTnLst>
+              </p:cTn>
+              <p:prevCondLst>
+                <p:cond evt="onPrev" delay="0">
+                  <p:tgtEl>
+                    <p:sldTgt/>
+                  </p:tgtEl>
+                </p:cond>
+              </p:prevCondLst>
+              <p:nextCondLst>
+                <p:cond evt="onNext" delay="0">
+                  <p:tgtEl>
+                    <p:sldTgt/>
+                  </p:tgtEl>
+                </p:cond>
+              </p:nextCondLst>
+            </p:seq>
+          </p:childTnLst>
+        </p:cTn>
       </p:par>
     </p:tnLst>
+    <p:bldLst>
+      <p:bldP spid="4" grpId="0" animBg="1"/>
+      <p:bldP spid="5" grpId="0" animBg="1"/>
+      <p:bldP spid="6" grpId="0" animBg="1"/>
+      <p:bldP spid="7" grpId="0" animBg="1"/>
+      <p:bldP spid="8" grpId="0" animBg="1"/>
+      <p:bldP spid="9" grpId="0"/>
+    </p:bldLst>
   </p:timing>
 </p:sld>
 </file>
@@ -5763,7 +6144,7 @@
             <a:pPr algn="l"/>
             <a:r>
               <a:rPr lang="en-US" dirty="0" smtClean="0"/>
-              <a:t>Sauces and Pickles</a:t>
+              <a:t>Key Features</a:t>
             </a:r>
             <a:endParaRPr lang="en-US" dirty="0"/>
           </a:p>
@@ -5781,171 +6162,179 @@
         </p:nvSpPr>
         <p:spPr>
           <a:xfrm>
-            <a:off x="739775" y="2486384"/>
-            <a:ext cx="7662864" cy="3890323"/>
+            <a:off x="457199" y="2513404"/>
+            <a:ext cx="8419945" cy="3971383"/>
           </a:xfrm>
         </p:spPr>
         <p:txBody>
           <a:bodyPr>
-            <a:normAutofit fontScale="92500" lnSpcReduction="20000"/>
+            <a:normAutofit/>
           </a:bodyPr>
           <a:lstStyle/>
           <a:p>
             <a:pPr>
               <a:lnSpc>
-                <a:spcPct val="90000"/>
+                <a:spcPct val="80000"/>
               </a:lnSpc>
               <a:spcBef>
-                <a:spcPts val="1400"/>
+                <a:spcPts val="1200"/>
               </a:spcBef>
             </a:pPr>
             <a:r>
-              <a:rPr lang="en-US" dirty="0" smtClean="0"/>
-              <a:t>Packaged with over 250 built-in operators</a:t>
+              <a:rPr lang="en-US" sz="2000" dirty="0" smtClean="0"/>
+              <a:t>Familiar tabular environment to manage, manipulate, and analyze data</a:t>
             </a:r>
           </a:p>
           <a:p>
             <a:pPr>
               <a:lnSpc>
-                <a:spcPct val="90000"/>
+                <a:spcPct val="80000"/>
               </a:lnSpc>
               <a:spcBef>
-                <a:spcPts val="1400"/>
+                <a:spcPts val="1200"/>
               </a:spcBef>
             </a:pPr>
             <a:r>
-              <a:rPr lang="en-US" dirty="0"/>
-              <a:t>Integrated support for </a:t>
-            </a:r>
-            <a:r>
-              <a:rPr lang="en-US" dirty="0" err="1"/>
-              <a:t>RESTful</a:t>
-            </a:r>
-            <a:r>
-              <a:rPr lang="en-US" dirty="0"/>
-              <a:t> Web Services</a:t>
+              <a:rPr lang="en-US" sz="2000" dirty="0" smtClean="0"/>
+              <a:t>Native support for complex (as well as simple) data types</a:t>
             </a:r>
           </a:p>
           <a:p>
             <a:pPr>
               <a:lnSpc>
-                <a:spcPct val="90000"/>
+                <a:spcPct val="80000"/>
               </a:lnSpc>
               <a:spcBef>
-                <a:spcPts val="1400"/>
+                <a:spcPts val="1200"/>
               </a:spcBef>
             </a:pPr>
             <a:r>
-              <a:rPr lang="en-US" dirty="0"/>
-              <a:t>Hybrid tables (RDBMS, Log File integration</a:t>
-            </a:r>
-            <a:r>
-              <a:rPr lang="en-US" dirty="0" smtClean="0"/>
-              <a:t>)</a:t>
+              <a:rPr lang="en-US" sz="2000" dirty="0" smtClean="0"/>
+              <a:t>Derivable rows, columns and cells</a:t>
             </a:r>
           </a:p>
           <a:p>
             <a:pPr>
               <a:lnSpc>
-                <a:spcPct val="90000"/>
+                <a:spcPct val="80000"/>
               </a:lnSpc>
               <a:spcBef>
-                <a:spcPts val="1400"/>
+                <a:spcPts val="1200"/>
               </a:spcBef>
             </a:pPr>
             <a:r>
-              <a:rPr lang="en-US" dirty="0" smtClean="0"/>
-              <a:t>Feature</a:t>
-            </a:r>
-            <a:r>
-              <a:rPr lang="en-US" dirty="0" smtClean="0"/>
-              <a:t>-rich Excel integration (import and export, formulas)</a:t>
+              <a:rPr lang="en-US" sz="2000" dirty="0" smtClean="0"/>
+              <a:t>Support for compute-intensive/asynchronous derivations</a:t>
             </a:r>
           </a:p>
           <a:p>
             <a:pPr>
               <a:lnSpc>
-                <a:spcPct val="90000"/>
+                <a:spcPct val="80000"/>
               </a:lnSpc>
               <a:spcBef>
-                <a:spcPts val="1400"/>
+                <a:spcPts val="1200"/>
               </a:spcBef>
             </a:pPr>
             <a:r>
-              <a:rPr lang="en-US" dirty="0" smtClean="0"/>
-              <a:t>PDF, HTML, and MS Word export</a:t>
+              <a:rPr lang="en-US" sz="2000" dirty="0" smtClean="0"/>
+              <a:t>Robust </a:t>
+            </a:r>
+            <a:r>
+              <a:rPr lang="en-US" sz="2000" dirty="0"/>
+              <a:t>dependency </a:t>
+            </a:r>
+            <a:r>
+              <a:rPr lang="en-US" sz="2000" dirty="0" smtClean="0"/>
+              <a:t>engine</a:t>
             </a:r>
           </a:p>
           <a:p>
             <a:pPr>
               <a:lnSpc>
-                <a:spcPct val="90000"/>
+                <a:spcPct val="80000"/>
               </a:lnSpc>
               <a:spcBef>
-                <a:spcPts val="1400"/>
+                <a:spcPts val="1200"/>
               </a:spcBef>
             </a:pPr>
             <a:r>
-              <a:rPr lang="en-US" dirty="0" smtClean="0"/>
-              <a:t>IFS to PFS to IFS expression parsing &amp; generation; can translate formulas from one language to </a:t>
-            </a:r>
-            <a:r>
-              <a:rPr lang="en-US" dirty="0" smtClean="0"/>
-              <a:t>another</a:t>
-            </a:r>
-            <a:endParaRPr lang="en-US" dirty="0" smtClean="0"/>
+              <a:rPr lang="en-US" sz="2000" dirty="0" smtClean="0"/>
+              <a:t>Rational environment to develop descriptors (“nibbles”)</a:t>
+            </a:r>
+            <a:endParaRPr lang="en-US" sz="2000" dirty="0"/>
           </a:p>
           <a:p>
             <a:pPr>
               <a:lnSpc>
-                <a:spcPct val="90000"/>
+                <a:spcPct val="80000"/>
               </a:lnSpc>
               <a:spcBef>
-                <a:spcPts val="1400"/>
+                <a:spcPts val="1200"/>
               </a:spcBef>
             </a:pPr>
             <a:r>
-              <a:rPr lang="en-US" dirty="0" smtClean="0"/>
-              <a:t>Cell validation/transformation support</a:t>
-            </a:r>
-          </a:p>
-          <a:p>
-            <a:pPr>
+              <a:rPr lang="en-US" sz="2000" dirty="0" smtClean="0"/>
+              <a:t>Extensible operators and operator overloading:</a:t>
+            </a:r>
+          </a:p>
+          <a:p>
+            <a:pPr lvl="1">
               <a:lnSpc>
-                <a:spcPct val="90000"/>
+                <a:spcPct val="80000"/>
               </a:lnSpc>
               <a:spcBef>
-                <a:spcPts val="1400"/>
+                <a:spcPts val="1200"/>
               </a:spcBef>
             </a:pPr>
             <a:r>
+              <a:rPr lang="en-US" dirty="0"/>
+              <a:t>using </a:t>
+            </a:r>
+            <a:r>
               <a:rPr lang="en-US" dirty="0" smtClean="0"/>
-              <a:t>Event listener support</a:t>
-            </a:r>
-          </a:p>
-          <a:p>
-            <a:pPr>
+              <a:t>Groovy &amp; Python/</a:t>
+            </a:r>
+            <a:r>
+              <a:rPr lang="en-US" dirty="0" err="1" smtClean="0"/>
+              <a:t>Jython</a:t>
+            </a:r>
+            <a:endParaRPr lang="en-US" dirty="0" smtClean="0"/>
+          </a:p>
+          <a:p>
+            <a:pPr lvl="1">
               <a:lnSpc>
-                <a:spcPct val="90000"/>
+                <a:spcPct val="80000"/>
               </a:lnSpc>
               <a:spcBef>
-                <a:spcPts val="1400"/>
+                <a:spcPts val="1200"/>
               </a:spcBef>
             </a:pPr>
             <a:r>
               <a:rPr lang="en-US" dirty="0" smtClean="0"/>
-              <a:t>Tagging</a:t>
-            </a:r>
-          </a:p>
-          <a:p>
-            <a:endParaRPr lang="en-US" dirty="0"/>
+              <a:t>using Java</a:t>
+            </a:r>
+          </a:p>
+          <a:p>
+            <a:pPr lvl="1">
+              <a:lnSpc>
+                <a:spcPct val="80000"/>
+              </a:lnSpc>
+              <a:spcBef>
+                <a:spcPts val="1200"/>
+              </a:spcBef>
+            </a:pPr>
+            <a:r>
+              <a:rPr lang="en-US" dirty="0" smtClean="0"/>
+              <a:t>using closures (lambda expressions)</a:t>
+            </a:r>
           </a:p>
         </p:txBody>
       </p:sp>
     </p:spTree>
     <p:extLst>
       <p:ext uri="{BB962C8B-B14F-4D97-AF65-F5344CB8AC3E}">
-        <p14:creationId xmlns:p14="http://schemas.microsoft.com/office/powerpoint/2010/main" val="843770871"/>
+        <p14:creationId xmlns:p14="http://schemas.microsoft.com/office/powerpoint/2010/main" val="3224151931"/>
       </p:ext>
     </p:extLst>
   </p:cSld>
@@ -5997,7 +6386,7 @@
             <a:pPr algn="l"/>
             <a:r>
               <a:rPr lang="en-US" dirty="0" smtClean="0"/>
-              <a:t>Potential Use Cases</a:t>
+              <a:t>Sauces and Pickles</a:t>
             </a:r>
             <a:endParaRPr lang="en-US" dirty="0"/>
           </a:p>
@@ -6015,71 +6404,152 @@
         </p:nvSpPr>
         <p:spPr>
           <a:xfrm>
-            <a:off x="739775" y="2445855"/>
-            <a:ext cx="7662864" cy="3890322"/>
+            <a:off x="739775" y="2486384"/>
+            <a:ext cx="7662864" cy="3890323"/>
           </a:xfrm>
         </p:spPr>
         <p:txBody>
-          <a:bodyPr/>
-          <a:lstStyle/>
-          <a:p>
+          <a:bodyPr>
+            <a:normAutofit fontScale="92500" lnSpcReduction="20000"/>
+          </a:bodyPr>
+          <a:lstStyle/>
+          <a:p>
+            <a:pPr>
+              <a:lnSpc>
+                <a:spcPct val="90000"/>
+              </a:lnSpc>
+              <a:spcBef>
+                <a:spcPts val="1400"/>
+              </a:spcBef>
+            </a:pPr>
             <a:r>
               <a:rPr lang="en-US" dirty="0" smtClean="0"/>
-              <a:t>Heart of a modeling/ad-hoc data analysis application</a:t>
-            </a:r>
-          </a:p>
-          <a:p>
+              <a:t>Packaged with over 250 built-in operators</a:t>
+            </a:r>
+          </a:p>
+          <a:p>
+            <a:pPr>
+              <a:lnSpc>
+                <a:spcPct val="90000"/>
+              </a:lnSpc>
+              <a:spcBef>
+                <a:spcPts val="1400"/>
+              </a:spcBef>
+            </a:pPr>
+            <a:r>
+              <a:rPr lang="en-US" dirty="0"/>
+              <a:t>Integrated support for </a:t>
+            </a:r>
+            <a:r>
+              <a:rPr lang="en-US" dirty="0" err="1"/>
+              <a:t>RESTful</a:t>
+            </a:r>
+            <a:r>
+              <a:rPr lang="en-US" dirty="0"/>
+              <a:t> Web Services</a:t>
+            </a:r>
+          </a:p>
+          <a:p>
+            <a:pPr>
+              <a:lnSpc>
+                <a:spcPct val="90000"/>
+              </a:lnSpc>
+              <a:spcBef>
+                <a:spcPts val="1400"/>
+              </a:spcBef>
+            </a:pPr>
+            <a:r>
+              <a:rPr lang="en-US" dirty="0"/>
+              <a:t>Hybrid tables (RDBMS, Log File integration</a:t>
+            </a:r>
             <a:r>
               <a:rPr lang="en-US" dirty="0" smtClean="0"/>
-              <a:t>“Computed Fields” engine for </a:t>
-            </a:r>
-            <a:r>
-              <a:rPr lang="en-US" dirty="0" err="1" smtClean="0"/>
-              <a:t>SaaS</a:t>
-            </a:r>
+              <a:t>)</a:t>
+            </a:r>
+          </a:p>
+          <a:p>
+            <a:pPr>
+              <a:lnSpc>
+                <a:spcPct val="90000"/>
+              </a:lnSpc>
+              <a:spcBef>
+                <a:spcPts val="1400"/>
+              </a:spcBef>
+            </a:pPr>
             <a:r>
               <a:rPr lang="en-US" dirty="0" smtClean="0"/>
-              <a:t> applications</a:t>
-            </a:r>
-          </a:p>
-          <a:p>
+              <a:t>Feature-rich Excel integration (import and export, formulas)</a:t>
+            </a:r>
+          </a:p>
+          <a:p>
+            <a:pPr>
+              <a:lnSpc>
+                <a:spcPct val="90000"/>
+              </a:lnSpc>
+              <a:spcBef>
+                <a:spcPts val="1400"/>
+              </a:spcBef>
+            </a:pPr>
             <a:r>
               <a:rPr lang="en-US" dirty="0" smtClean="0"/>
-              <a:t>Reporting/Excel Export environment for </a:t>
-            </a:r>
-            <a:r>
-              <a:rPr lang="en-US" dirty="0" err="1" smtClean="0"/>
-              <a:t>SaaS</a:t>
-            </a:r>
+              <a:t>PDF, HTML, and MS Word export</a:t>
+            </a:r>
+          </a:p>
+          <a:p>
+            <a:pPr>
+              <a:lnSpc>
+                <a:spcPct val="90000"/>
+              </a:lnSpc>
+              <a:spcBef>
+                <a:spcPts val="1400"/>
+              </a:spcBef>
+            </a:pPr>
             <a:r>
               <a:rPr lang="en-US" dirty="0" smtClean="0"/>
-              <a:t> applications</a:t>
-            </a:r>
-          </a:p>
-          <a:p>
-            <a:r>
-              <a:rPr lang="en-US" dirty="0" err="1" smtClean="0"/>
-              <a:t>IoT</a:t>
-            </a:r>
+              <a:t>IFS to PFS to IFS expression parsing &amp; generation; can translate formulas from one language to another</a:t>
+            </a:r>
+          </a:p>
+          <a:p>
+            <a:pPr>
+              <a:lnSpc>
+                <a:spcPct val="90000"/>
+              </a:lnSpc>
+              <a:spcBef>
+                <a:spcPts val="1400"/>
+              </a:spcBef>
+            </a:pPr>
             <a:r>
               <a:rPr lang="en-US" dirty="0" smtClean="0"/>
-              <a:t> dashboard data aggregator</a:t>
-            </a:r>
-          </a:p>
-          <a:p>
+              <a:t>Cell validation/transformation support</a:t>
+            </a:r>
+          </a:p>
+          <a:p>
+            <a:pPr>
+              <a:lnSpc>
+                <a:spcPct val="90000"/>
+              </a:lnSpc>
+              <a:spcBef>
+                <a:spcPts val="1400"/>
+              </a:spcBef>
+            </a:pPr>
             <a:r>
               <a:rPr lang="en-US" dirty="0" smtClean="0"/>
-              <a:t>Workbench for function/operator prototyping/development</a:t>
-            </a:r>
-          </a:p>
-          <a:p>
+              <a:t>Event listener support</a:t>
+            </a:r>
+          </a:p>
+          <a:p>
+            <a:pPr>
+              <a:lnSpc>
+                <a:spcPct val="90000"/>
+              </a:lnSpc>
+              <a:spcBef>
+                <a:spcPts val="1400"/>
+              </a:spcBef>
+            </a:pPr>
             <a:r>
               <a:rPr lang="en-US" dirty="0" smtClean="0"/>
-              <a:t>Workbench for REST-based API experimentation</a:t>
-            </a:r>
-          </a:p>
-          <a:p>
-            <a:endParaRPr lang="en-US" dirty="0" smtClean="0"/>
+              <a:t>Tagging</a:t>
+            </a:r>
           </a:p>
           <a:p>
             <a:endParaRPr lang="en-US" dirty="0"/>
@@ -6089,7 +6559,7 @@
     </p:spTree>
     <p:extLst>
       <p:ext uri="{BB962C8B-B14F-4D97-AF65-F5344CB8AC3E}">
-        <p14:creationId xmlns:p14="http://schemas.microsoft.com/office/powerpoint/2010/main" val="3107410314"/>
+        <p14:creationId xmlns:p14="http://schemas.microsoft.com/office/powerpoint/2010/main" val="843770871"/>
       </p:ext>
     </p:extLst>
   </p:cSld>
@@ -6141,6 +6611,150 @@
             <a:pPr algn="l"/>
             <a:r>
               <a:rPr lang="en-US" dirty="0" smtClean="0"/>
+              <a:t>Potential Use Cases</a:t>
+            </a:r>
+            <a:endParaRPr lang="en-US" dirty="0"/>
+          </a:p>
+        </p:txBody>
+      </p:sp>
+      <p:sp>
+        <p:nvSpPr>
+          <p:cNvPr id="3" name="Content Placeholder 2"/>
+          <p:cNvSpPr>
+            <a:spLocks noGrp="1"/>
+          </p:cNvSpPr>
+          <p:nvPr>
+            <p:ph idx="1"/>
+          </p:nvPr>
+        </p:nvSpPr>
+        <p:spPr>
+          <a:xfrm>
+            <a:off x="739775" y="2445855"/>
+            <a:ext cx="7662864" cy="3890322"/>
+          </a:xfrm>
+        </p:spPr>
+        <p:txBody>
+          <a:bodyPr/>
+          <a:lstStyle/>
+          <a:p>
+            <a:r>
+              <a:rPr lang="en-US" dirty="0" smtClean="0"/>
+              <a:t>Heart of a modeling/ad-hoc data analysis application</a:t>
+            </a:r>
+          </a:p>
+          <a:p>
+            <a:r>
+              <a:rPr lang="en-US" dirty="0" smtClean="0"/>
+              <a:t>“Computed Fields” engine for </a:t>
+            </a:r>
+            <a:r>
+              <a:rPr lang="en-US" dirty="0" err="1" smtClean="0"/>
+              <a:t>SaaS</a:t>
+            </a:r>
+            <a:r>
+              <a:rPr lang="en-US" dirty="0" smtClean="0"/>
+              <a:t> applications</a:t>
+            </a:r>
+          </a:p>
+          <a:p>
+            <a:r>
+              <a:rPr lang="en-US" dirty="0" smtClean="0"/>
+              <a:t>Reporting/Excel Export environment for </a:t>
+            </a:r>
+            <a:r>
+              <a:rPr lang="en-US" dirty="0" err="1" smtClean="0"/>
+              <a:t>SaaS</a:t>
+            </a:r>
+            <a:r>
+              <a:rPr lang="en-US" dirty="0" smtClean="0"/>
+              <a:t> applications</a:t>
+            </a:r>
+          </a:p>
+          <a:p>
+            <a:r>
+              <a:rPr lang="en-US" dirty="0" err="1" smtClean="0"/>
+              <a:t>IoT</a:t>
+            </a:r>
+            <a:r>
+              <a:rPr lang="en-US" dirty="0" smtClean="0"/>
+              <a:t> dashboard data aggregator</a:t>
+            </a:r>
+          </a:p>
+          <a:p>
+            <a:r>
+              <a:rPr lang="en-US" dirty="0" smtClean="0"/>
+              <a:t>Workbench for function/operator prototyping/development</a:t>
+            </a:r>
+          </a:p>
+          <a:p>
+            <a:r>
+              <a:rPr lang="en-US" dirty="0" smtClean="0"/>
+              <a:t>Workbench for REST-based API experimentation</a:t>
+            </a:r>
+          </a:p>
+          <a:p>
+            <a:endParaRPr lang="en-US" dirty="0" smtClean="0"/>
+          </a:p>
+          <a:p>
+            <a:endParaRPr lang="en-US" dirty="0"/>
+          </a:p>
+        </p:txBody>
+      </p:sp>
+    </p:spTree>
+    <p:extLst>
+      <p:ext uri="{BB962C8B-B14F-4D97-AF65-F5344CB8AC3E}">
+        <p14:creationId xmlns:p14="http://schemas.microsoft.com/office/powerpoint/2010/main" val="3107410314"/>
+      </p:ext>
+    </p:extLst>
+  </p:cSld>
+  <p:clrMapOvr>
+    <a:masterClrMapping/>
+  </p:clrMapOvr>
+  <p:timing>
+    <p:tnLst>
+      <p:par>
+        <p:cTn xmlns:p14="http://schemas.microsoft.com/office/powerpoint/2010/main" id="1" dur="indefinite" restart="never" nodeType="tmRoot"/>
+      </p:par>
+    </p:tnLst>
+  </p:timing>
+</p:sld>
+</file>
+
+<file path=ppt/slides/slide8.xml><?xml version="1.0" encoding="utf-8"?>
+<p:sld xmlns:a="http://schemas.openxmlformats.org/drawingml/2006/main" xmlns:r="http://schemas.openxmlformats.org/officeDocument/2006/relationships" xmlns:p="http://schemas.openxmlformats.org/presentationml/2006/main">
+  <p:cSld>
+    <p:spTree>
+      <p:nvGrpSpPr>
+        <p:cNvPr id="1" name=""/>
+        <p:cNvGrpSpPr/>
+        <p:nvPr/>
+      </p:nvGrpSpPr>
+      <p:grpSpPr>
+        <a:xfrm>
+          <a:off x="0" y="0"/>
+          <a:ext cx="0" cy="0"/>
+          <a:chOff x="0" y="0"/>
+          <a:chExt cx="0" cy="0"/>
+        </a:xfrm>
+      </p:grpSpPr>
+      <p:sp>
+        <p:nvSpPr>
+          <p:cNvPr id="2" name="Title 1"/>
+          <p:cNvSpPr>
+            <a:spLocks noGrp="1"/>
+          </p:cNvSpPr>
+          <p:nvPr>
+            <p:ph type="title"/>
+          </p:nvPr>
+        </p:nvSpPr>
+        <p:spPr/>
+        <p:txBody>
+          <a:bodyPr/>
+          <a:lstStyle/>
+          <a:p>
+            <a:pPr algn="l"/>
+            <a:r>
+              <a:rPr lang="en-US" dirty="0" smtClean="0"/>
               <a:t>Architecture</a:t>
             </a:r>
             <a:endParaRPr lang="en-US" dirty="0"/>
@@ -6243,7 +6857,7 @@
 </p:sld>
 </file>
 
-<file path=ppt/slides/slide8.xml><?xml version="1.0" encoding="utf-8"?>
+<file path=ppt/slides/slide9.xml><?xml version="1.0" encoding="utf-8"?>
 <p:sld xmlns:a="http://schemas.openxmlformats.org/drawingml/2006/main" xmlns:r="http://schemas.openxmlformats.org/officeDocument/2006/relationships" xmlns:p="http://schemas.openxmlformats.org/presentationml/2006/main">
   <p:cSld>
     <p:spTree>

</xml_diff>

<commit_message>
Minimal support for BigDecimal
</commit_message>
<xml_diff>
--- a/doc/TMS Overview.pptx
+++ b/doc/TMS Overview.pptx
@@ -10,10 +10,11 @@
     <p:sldId id="257" r:id="rId4"/>
     <p:sldId id="264" r:id="rId5"/>
     <p:sldId id="258" r:id="rId6"/>
-    <p:sldId id="260" r:id="rId7"/>
-    <p:sldId id="262" r:id="rId8"/>
-    <p:sldId id="259" r:id="rId9"/>
-    <p:sldId id="261" r:id="rId10"/>
+    <p:sldId id="265" r:id="rId7"/>
+    <p:sldId id="260" r:id="rId8"/>
+    <p:sldId id="262" r:id="rId9"/>
+    <p:sldId id="259" r:id="rId10"/>
+    <p:sldId id="261" r:id="rId11"/>
   </p:sldIdLst>
   <p:sldSz cx="9144000" cy="6858000" type="screen4x3"/>
   <p:notesSz cx="6858000" cy="9144000"/>
@@ -311,7 +312,7 @@
           <a:p>
             <a:fld id="{679BC7E7-EA8E-4DA7-915E-CC098D9BADCB}" type="datetimeFigureOut">
               <a:rPr lang="en-US" smtClean="0"/>
-              <a:t>3/21/16</a:t>
+              <a:t>5/8/16</a:t>
             </a:fld>
             <a:endParaRPr lang="en-US"/>
           </a:p>
@@ -440,7 +441,7 @@
           <a:p>
             <a:fld id="{679BC7E7-EA8E-4DA7-915E-CC098D9BADCB}" type="datetimeFigureOut">
               <a:rPr lang="en-US" smtClean="0"/>
-              <a:t>3/21/16</a:t>
+              <a:t>5/8/16</a:t>
             </a:fld>
             <a:endParaRPr lang="en-US"/>
           </a:p>
@@ -745,7 +746,7 @@
           <a:p>
             <a:fld id="{679BC7E7-EA8E-4DA7-915E-CC098D9BADCB}" type="datetimeFigureOut">
               <a:rPr lang="en-US" smtClean="0"/>
-              <a:t>3/21/16</a:t>
+              <a:t>5/8/16</a:t>
             </a:fld>
             <a:endParaRPr lang="en-US"/>
           </a:p>
@@ -970,7 +971,7 @@
           <a:p>
             <a:fld id="{679BC7E7-EA8E-4DA7-915E-CC098D9BADCB}" type="datetimeFigureOut">
               <a:rPr lang="en-US" smtClean="0"/>
-              <a:t>3/21/16</a:t>
+              <a:t>5/8/16</a:t>
             </a:fld>
             <a:endParaRPr lang="en-US"/>
           </a:p>
@@ -1240,7 +1241,7 @@
           <a:p>
             <a:fld id="{679BC7E7-EA8E-4DA7-915E-CC098D9BADCB}" type="datetimeFigureOut">
               <a:rPr lang="en-US" smtClean="0"/>
-              <a:t>3/21/16</a:t>
+              <a:t>5/8/16</a:t>
             </a:fld>
             <a:endParaRPr lang="en-US"/>
           </a:p>
@@ -1565,7 +1566,7 @@
           <a:p>
             <a:fld id="{679BC7E7-EA8E-4DA7-915E-CC098D9BADCB}" type="datetimeFigureOut">
               <a:rPr lang="en-US" smtClean="0"/>
-              <a:t>3/21/16</a:t>
+              <a:t>5/8/16</a:t>
             </a:fld>
             <a:endParaRPr lang="en-US"/>
           </a:p>
@@ -1758,7 +1759,7 @@
           <a:p>
             <a:fld id="{679BC7E7-EA8E-4DA7-915E-CC098D9BADCB}" type="datetimeFigureOut">
               <a:rPr lang="en-US" smtClean="0"/>
-              <a:t>3/21/16</a:t>
+              <a:t>5/8/16</a:t>
             </a:fld>
             <a:endParaRPr lang="en-US"/>
           </a:p>
@@ -1862,7 +1863,7 @@
           <a:p>
             <a:fld id="{679BC7E7-EA8E-4DA7-915E-CC098D9BADCB}" type="datetimeFigureOut">
               <a:rPr lang="en-US" smtClean="0"/>
-              <a:t>3/21/16</a:t>
+              <a:t>5/8/16</a:t>
             </a:fld>
             <a:endParaRPr lang="en-US"/>
           </a:p>
@@ -2031,7 +2032,7 @@
           <a:p>
             <a:fld id="{679BC7E7-EA8E-4DA7-915E-CC098D9BADCB}" type="datetimeFigureOut">
               <a:rPr lang="en-US" smtClean="0"/>
-              <a:t>3/21/16</a:t>
+              <a:t>5/8/16</a:t>
             </a:fld>
             <a:endParaRPr lang="en-US"/>
           </a:p>
@@ -2295,7 +2296,7 @@
           <a:p>
             <a:fld id="{679BC7E7-EA8E-4DA7-915E-CC098D9BADCB}" type="datetimeFigureOut">
               <a:rPr lang="en-US" smtClean="0"/>
-              <a:t>3/21/16</a:t>
+              <a:t>5/8/16</a:t>
             </a:fld>
             <a:endParaRPr lang="en-US"/>
           </a:p>
@@ -2629,7 +2630,7 @@
           <a:p>
             <a:fld id="{679BC7E7-EA8E-4DA7-915E-CC098D9BADCB}" type="datetimeFigureOut">
               <a:rPr lang="en-US" smtClean="0"/>
-              <a:t>3/21/16</a:t>
+              <a:t>5/8/16</a:t>
             </a:fld>
             <a:endParaRPr lang="en-US"/>
           </a:p>
@@ -3070,7 +3071,7 @@
           <a:p>
             <a:fld id="{679BC7E7-EA8E-4DA7-915E-CC098D9BADCB}" type="datetimeFigureOut">
               <a:rPr lang="en-US" smtClean="0"/>
-              <a:t>3/21/16</a:t>
+              <a:t>5/8/16</a:t>
             </a:fld>
             <a:endParaRPr lang="en-US"/>
           </a:p>
@@ -3268,7 +3269,7 @@
           <a:p>
             <a:fld id="{679BC7E7-EA8E-4DA7-915E-CC098D9BADCB}" type="datetimeFigureOut">
               <a:rPr lang="en-US" smtClean="0"/>
-              <a:t>3/21/16</a:t>
+              <a:t>5/8/16</a:t>
             </a:fld>
             <a:endParaRPr lang="en-US"/>
           </a:p>
@@ -3551,7 +3552,7 @@
           <a:p>
             <a:fld id="{679BC7E7-EA8E-4DA7-915E-CC098D9BADCB}" type="datetimeFigureOut">
               <a:rPr lang="en-US" smtClean="0"/>
-              <a:t>3/21/16</a:t>
+              <a:t>5/8/16</a:t>
             </a:fld>
             <a:endParaRPr lang="en-US"/>
           </a:p>
@@ -3919,7 +3920,7 @@
           <a:p>
             <a:fld id="{679BC7E7-EA8E-4DA7-915E-CC098D9BADCB}" type="datetimeFigureOut">
               <a:rPr lang="en-US" smtClean="0"/>
-              <a:t>3/21/16</a:t>
+              <a:t>5/8/16</a:t>
             </a:fld>
             <a:endParaRPr lang="en-US"/>
           </a:p>
@@ -4415,7 +4416,7 @@
           <a:p>
             <a:fld id="{679BC7E7-EA8E-4DA7-915E-CC098D9BADCB}" type="datetimeFigureOut">
               <a:rPr lang="en-US" smtClean="0"/>
-              <a:t>3/21/16</a:t>
+              <a:t>5/8/16</a:t>
             </a:fld>
             <a:endParaRPr lang="en-US"/>
           </a:p>
@@ -4624,7 +4625,7 @@
           <a:p>
             <a:fld id="{679BC7E7-EA8E-4DA7-915E-CC098D9BADCB}" type="datetimeFigureOut">
               <a:rPr lang="en-US" smtClean="0"/>
-              <a:t>3/21/16</a:t>
+              <a:t>5/8/16</a:t>
             </a:fld>
             <a:endParaRPr lang="en-US"/>
           </a:p>
@@ -5145,6 +5146,133 @@
 </p:sld>
 </file>
 
+<file path=ppt/slides/slide10.xml><?xml version="1.0" encoding="utf-8"?>
+<p:sld xmlns:a="http://schemas.openxmlformats.org/drawingml/2006/main" xmlns:r="http://schemas.openxmlformats.org/officeDocument/2006/relationships" xmlns:p="http://schemas.openxmlformats.org/presentationml/2006/main">
+  <p:cSld>
+    <p:spTree>
+      <p:nvGrpSpPr>
+        <p:cNvPr id="1" name=""/>
+        <p:cNvGrpSpPr/>
+        <p:nvPr/>
+      </p:nvGrpSpPr>
+      <p:grpSpPr>
+        <a:xfrm>
+          <a:off x="0" y="0"/>
+          <a:ext cx="0" cy="0"/>
+          <a:chOff x="0" y="0"/>
+          <a:chExt cx="0" cy="0"/>
+        </a:xfrm>
+      </p:grpSpPr>
+      <p:sp>
+        <p:nvSpPr>
+          <p:cNvPr id="2" name="Title 1"/>
+          <p:cNvSpPr>
+            <a:spLocks noGrp="1"/>
+          </p:cNvSpPr>
+          <p:nvPr>
+            <p:ph type="title"/>
+          </p:nvPr>
+        </p:nvSpPr>
+        <p:spPr/>
+        <p:txBody>
+          <a:bodyPr/>
+          <a:lstStyle/>
+          <a:p>
+            <a:pPr algn="l"/>
+            <a:r>
+              <a:rPr lang="en-US" dirty="0"/>
+              <a:t>3</a:t>
+            </a:r>
+            <a:r>
+              <a:rPr lang="en-US" baseline="30000" dirty="0"/>
+              <a:t>rd</a:t>
+            </a:r>
+            <a:r>
+              <a:rPr lang="en-US" dirty="0"/>
+              <a:t> Party Libraries</a:t>
+            </a:r>
+          </a:p>
+        </p:txBody>
+      </p:sp>
+      <p:sp>
+        <p:nvSpPr>
+          <p:cNvPr id="3" name="Content Placeholder 2"/>
+          <p:cNvSpPr>
+            <a:spLocks noGrp="1"/>
+          </p:cNvSpPr>
+          <p:nvPr>
+            <p:ph idx="1"/>
+          </p:nvPr>
+        </p:nvSpPr>
+        <p:spPr/>
+        <p:txBody>
+          <a:bodyPr>
+            <a:normAutofit lnSpcReduction="10000"/>
+          </a:bodyPr>
+          <a:lstStyle/>
+          <a:p>
+            <a:r>
+              <a:rPr lang="en-US" dirty="0" smtClean="0"/>
+              <a:t>Jasper Reports</a:t>
+            </a:r>
+          </a:p>
+          <a:p>
+            <a:r>
+              <a:rPr lang="en-US" dirty="0" smtClean="0"/>
+              <a:t>Apache POI (Excel integration)</a:t>
+            </a:r>
+          </a:p>
+          <a:p>
+            <a:r>
+              <a:rPr lang="en-US" dirty="0" err="1" smtClean="0"/>
+              <a:t>Xstream</a:t>
+            </a:r>
+            <a:r>
+              <a:rPr lang="en-US" dirty="0" smtClean="0"/>
+              <a:t> (File IO)</a:t>
+            </a:r>
+          </a:p>
+          <a:p>
+            <a:r>
+              <a:rPr lang="en-US" dirty="0" smtClean="0"/>
+              <a:t>Commons CSV</a:t>
+            </a:r>
+          </a:p>
+          <a:p>
+            <a:r>
+              <a:rPr lang="en-US" dirty="0" smtClean="0"/>
+              <a:t>Commons Math (distributions, advanced math)</a:t>
+            </a:r>
+          </a:p>
+          <a:p>
+            <a:r>
+              <a:rPr lang="en-US" dirty="0" smtClean="0"/>
+              <a:t>JSON Simple</a:t>
+            </a:r>
+            <a:endParaRPr lang="en-US" dirty="0"/>
+          </a:p>
+        </p:txBody>
+      </p:sp>
+    </p:spTree>
+    <p:extLst>
+      <p:ext uri="{BB962C8B-B14F-4D97-AF65-F5344CB8AC3E}">
+        <p14:creationId xmlns:p14="http://schemas.microsoft.com/office/powerpoint/2010/main" val="1321442216"/>
+      </p:ext>
+    </p:extLst>
+  </p:cSld>
+  <p:clrMapOvr>
+    <a:masterClrMapping/>
+  </p:clrMapOvr>
+  <p:timing>
+    <p:tnLst>
+      <p:par>
+        <p:cTn xmlns:p14="http://schemas.microsoft.com/office/powerpoint/2010/main" id="1" dur="indefinite" restart="never" nodeType="tmRoot"/>
+      </p:par>
+    </p:tnLst>
+  </p:timing>
+</p:sld>
+</file>
+
 <file path=ppt/slides/slide2.xml><?xml version="1.0" encoding="utf-8"?>
 <p:sld xmlns:a="http://schemas.openxmlformats.org/drawingml/2006/main" xmlns:r="http://schemas.openxmlformats.org/officeDocument/2006/relationships" xmlns:p="http://schemas.openxmlformats.org/presentationml/2006/main">
   <p:cSld>
@@ -6181,7 +6309,7 @@
               </a:spcBef>
             </a:pPr>
             <a:r>
-              <a:rPr lang="en-US" sz="2000" dirty="0" smtClean="0"/>
+              <a:rPr lang="en-US" sz="2400" dirty="0" smtClean="0"/>
               <a:t>Familiar tabular environment to manage, manipulate, and analyze data</a:t>
             </a:r>
           </a:p>
@@ -6195,7 +6323,7 @@
               </a:spcBef>
             </a:pPr>
             <a:r>
-              <a:rPr lang="en-US" sz="2000" dirty="0" smtClean="0"/>
+              <a:rPr lang="en-US" sz="2400" dirty="0" smtClean="0"/>
               <a:t>Native support for complex (as well as simple) data types</a:t>
             </a:r>
           </a:p>
@@ -6209,7 +6337,7 @@
               </a:spcBef>
             </a:pPr>
             <a:r>
-              <a:rPr lang="en-US" sz="2000" dirty="0" smtClean="0"/>
+              <a:rPr lang="en-US" sz="2400" dirty="0" smtClean="0"/>
               <a:t>Derivable rows, columns and cells</a:t>
             </a:r>
           </a:p>
@@ -6223,7 +6351,7 @@
               </a:spcBef>
             </a:pPr>
             <a:r>
-              <a:rPr lang="en-US" sz="2000" dirty="0" smtClean="0"/>
+              <a:rPr lang="en-US" sz="2400" dirty="0" smtClean="0"/>
               <a:t>Support for compute-intensive/asynchronous derivations</a:t>
             </a:r>
           </a:p>
@@ -6237,15 +6365,15 @@
               </a:spcBef>
             </a:pPr>
             <a:r>
-              <a:rPr lang="en-US" sz="2000" dirty="0" smtClean="0"/>
+              <a:rPr lang="en-US" sz="2400" dirty="0" smtClean="0"/>
               <a:t>Robust </a:t>
             </a:r>
             <a:r>
-              <a:rPr lang="en-US" sz="2000" dirty="0"/>
+              <a:rPr lang="en-US" sz="2400" dirty="0"/>
               <a:t>dependency </a:t>
             </a:r>
             <a:r>
-              <a:rPr lang="en-US" sz="2000" dirty="0" smtClean="0"/>
+              <a:rPr lang="en-US" sz="2400" dirty="0" smtClean="0"/>
               <a:t>engine</a:t>
             </a:r>
           </a:p>
@@ -6259,75 +6387,14 @@
               </a:spcBef>
             </a:pPr>
             <a:r>
-              <a:rPr lang="en-US" sz="2000" dirty="0" smtClean="0"/>
-              <a:t>Rational environment to develop descriptors (“nibbles”)</a:t>
-            </a:r>
-            <a:endParaRPr lang="en-US" sz="2000" dirty="0"/>
-          </a:p>
-          <a:p>
-            <a:pPr>
-              <a:lnSpc>
-                <a:spcPct val="80000"/>
-              </a:lnSpc>
-              <a:spcBef>
-                <a:spcPts val="1200"/>
-              </a:spcBef>
-            </a:pPr>
-            <a:r>
-              <a:rPr lang="en-US" sz="2000" dirty="0" smtClean="0"/>
-              <a:t>Extensible operators and operator overloading:</a:t>
-            </a:r>
-          </a:p>
-          <a:p>
-            <a:pPr lvl="1">
-              <a:lnSpc>
-                <a:spcPct val="80000"/>
-              </a:lnSpc>
-              <a:spcBef>
-                <a:spcPts val="1200"/>
-              </a:spcBef>
-            </a:pPr>
-            <a:r>
-              <a:rPr lang="en-US" dirty="0"/>
-              <a:t>using </a:t>
-            </a:r>
-            <a:r>
-              <a:rPr lang="en-US" dirty="0" smtClean="0"/>
-              <a:t>Groovy &amp; Python/</a:t>
-            </a:r>
-            <a:r>
-              <a:rPr lang="en-US" dirty="0" err="1" smtClean="0"/>
-              <a:t>Jython</a:t>
-            </a:r>
-            <a:endParaRPr lang="en-US" dirty="0" smtClean="0"/>
-          </a:p>
-          <a:p>
-            <a:pPr lvl="1">
-              <a:lnSpc>
-                <a:spcPct val="80000"/>
-              </a:lnSpc>
-              <a:spcBef>
-                <a:spcPts val="1200"/>
-              </a:spcBef>
-            </a:pPr>
-            <a:r>
-              <a:rPr lang="en-US" dirty="0" smtClean="0"/>
-              <a:t>using Java</a:t>
-            </a:r>
-          </a:p>
-          <a:p>
-            <a:pPr lvl="1">
-              <a:lnSpc>
-                <a:spcPct val="80000"/>
-              </a:lnSpc>
-              <a:spcBef>
-                <a:spcPts val="1200"/>
-              </a:spcBef>
-            </a:pPr>
-            <a:r>
-              <a:rPr lang="en-US" dirty="0" smtClean="0"/>
-              <a:t>using closures (lambda expressions)</a:t>
-            </a:r>
+              <a:rPr lang="en-US" sz="2400" dirty="0" smtClean="0"/>
+              <a:t>Rational environment to develop descriptors (“nibbles”</a:t>
+            </a:r>
+            <a:r>
+              <a:rPr lang="en-US" sz="2400" dirty="0" smtClean="0"/>
+              <a:t>)</a:t>
+            </a:r>
+            <a:endParaRPr lang="en-US" sz="2400" dirty="0"/>
           </a:p>
         </p:txBody>
       </p:sp>
@@ -6386,7 +6453,7 @@
             <a:pPr algn="l"/>
             <a:r>
               <a:rPr lang="en-US" dirty="0" smtClean="0"/>
-              <a:t>Sauces and Pickles</a:t>
+              <a:t>Derivations (Nibbles)</a:t>
             </a:r>
             <a:endParaRPr lang="en-US" dirty="0"/>
           </a:p>
@@ -6404,162 +6471,178 @@
         </p:nvSpPr>
         <p:spPr>
           <a:xfrm>
-            <a:off x="739775" y="2486384"/>
-            <a:ext cx="7662864" cy="3890323"/>
+            <a:off x="457199" y="2513404"/>
+            <a:ext cx="8419945" cy="3971383"/>
           </a:xfrm>
         </p:spPr>
         <p:txBody>
           <a:bodyPr>
-            <a:normAutofit fontScale="92500" lnSpcReduction="20000"/>
+            <a:normAutofit/>
           </a:bodyPr>
           <a:lstStyle/>
           <a:p>
             <a:pPr>
               <a:lnSpc>
-                <a:spcPct val="90000"/>
+                <a:spcPct val="80000"/>
               </a:lnSpc>
               <a:spcBef>
-                <a:spcPts val="1400"/>
+                <a:spcPts val="1200"/>
               </a:spcBef>
             </a:pPr>
             <a:r>
-              <a:rPr lang="en-US" dirty="0" smtClean="0"/>
-              <a:t>Packaged with over 250 built-in operators</a:t>
-            </a:r>
+              <a:rPr lang="en-US" sz="2000" dirty="0"/>
+              <a:t>D</a:t>
+            </a:r>
+            <a:r>
+              <a:rPr lang="en-US" sz="2000" dirty="0" smtClean="0"/>
+              <a:t>erived cells, rows, and columns</a:t>
+            </a:r>
+            <a:endParaRPr lang="en-US" sz="2000" dirty="0" smtClean="0"/>
           </a:p>
           <a:p>
             <a:pPr>
               <a:lnSpc>
-                <a:spcPct val="90000"/>
+                <a:spcPct val="80000"/>
               </a:lnSpc>
               <a:spcBef>
-                <a:spcPts val="1400"/>
+                <a:spcPts val="1200"/>
               </a:spcBef>
             </a:pPr>
             <a:r>
-              <a:rPr lang="en-US" dirty="0"/>
-              <a:t>Integrated support for </a:t>
-            </a:r>
-            <a:r>
-              <a:rPr lang="en-US" dirty="0" err="1"/>
-              <a:t>RESTful</a:t>
-            </a:r>
-            <a:r>
-              <a:rPr lang="en-US" dirty="0"/>
-              <a:t> Web Services</a:t>
-            </a:r>
+              <a:rPr lang="en-US" sz="2000" dirty="0"/>
+              <a:t>P</a:t>
+            </a:r>
+            <a:r>
+              <a:rPr lang="en-US" sz="2000" dirty="0" smtClean="0"/>
+              <a:t>eriodic execution</a:t>
+            </a:r>
+            <a:endParaRPr lang="en-US" sz="2000" dirty="0" smtClean="0"/>
           </a:p>
           <a:p>
             <a:pPr>
               <a:lnSpc>
-                <a:spcPct val="90000"/>
+                <a:spcPct val="80000"/>
               </a:lnSpc>
               <a:spcBef>
-                <a:spcPts val="1400"/>
+                <a:spcPts val="1200"/>
               </a:spcBef>
             </a:pPr>
             <a:r>
-              <a:rPr lang="en-US" dirty="0"/>
-              <a:t>Hybrid tables (RDBMS, Log File integration</a:t>
-            </a:r>
-            <a:r>
-              <a:rPr lang="en-US" dirty="0" smtClean="0"/>
-              <a:t>)</a:t>
-            </a:r>
+              <a:rPr lang="en-US" sz="2000" dirty="0"/>
+              <a:t>T</a:t>
+            </a:r>
+            <a:r>
+              <a:rPr lang="en-US" sz="2000" dirty="0" smtClean="0"/>
+              <a:t>ime-series execution</a:t>
+            </a:r>
+            <a:endParaRPr lang="en-US" sz="2000" dirty="0"/>
           </a:p>
           <a:p>
             <a:pPr>
               <a:lnSpc>
-                <a:spcPct val="90000"/>
+                <a:spcPct val="80000"/>
               </a:lnSpc>
               <a:spcBef>
-                <a:spcPts val="1400"/>
+                <a:spcPts val="1200"/>
               </a:spcBef>
             </a:pPr>
             <a:r>
-              <a:rPr lang="en-US" dirty="0" smtClean="0"/>
-              <a:t>Feature-rich Excel integration (import and export, formulas)</a:t>
-            </a:r>
+              <a:rPr lang="en-US" sz="2000" dirty="0" smtClean="0"/>
+              <a:t>Synchronous or Asynchronous</a:t>
+            </a:r>
+            <a:endParaRPr lang="en-US" sz="2000" dirty="0"/>
           </a:p>
           <a:p>
             <a:pPr>
               <a:lnSpc>
-                <a:spcPct val="90000"/>
+                <a:spcPct val="80000"/>
               </a:lnSpc>
               <a:spcBef>
-                <a:spcPts val="1400"/>
+                <a:spcPts val="1200"/>
               </a:spcBef>
             </a:pPr>
             <a:r>
-              <a:rPr lang="en-US" dirty="0" smtClean="0"/>
-              <a:t>PDF, HTML, and MS Word export</a:t>
-            </a:r>
+              <a:rPr lang="en-US" sz="2000" dirty="0" smtClean="0"/>
+              <a:t>Annotation support for exposing class methods</a:t>
+            </a:r>
+            <a:endParaRPr lang="en-US" sz="2000" dirty="0" smtClean="0"/>
           </a:p>
           <a:p>
             <a:pPr>
               <a:lnSpc>
-                <a:spcPct val="90000"/>
+                <a:spcPct val="80000"/>
               </a:lnSpc>
               <a:spcBef>
-                <a:spcPts val="1400"/>
+                <a:spcPts val="1200"/>
               </a:spcBef>
             </a:pPr>
             <a:r>
-              <a:rPr lang="en-US" dirty="0" smtClean="0"/>
-              <a:t>IFS to PFS to IFS expression parsing &amp; generation; can translate formulas from one language to another</a:t>
-            </a:r>
-          </a:p>
-          <a:p>
-            <a:pPr>
+              <a:rPr lang="en-US" sz="2000" dirty="0" smtClean="0"/>
+              <a:t>Extensible:</a:t>
+            </a:r>
+            <a:endParaRPr lang="en-US" sz="2000" dirty="0" smtClean="0"/>
+          </a:p>
+          <a:p>
+            <a:pPr lvl="1">
               <a:lnSpc>
-                <a:spcPct val="90000"/>
+                <a:spcPct val="80000"/>
               </a:lnSpc>
               <a:spcBef>
-                <a:spcPts val="1400"/>
+                <a:spcPts val="1200"/>
               </a:spcBef>
             </a:pPr>
             <a:r>
+              <a:rPr lang="en-US" dirty="0"/>
+              <a:t>using </a:t>
+            </a:r>
+            <a:r>
               <a:rPr lang="en-US" dirty="0" smtClean="0"/>
-              <a:t>Cell validation/transformation support</a:t>
-            </a:r>
-          </a:p>
-          <a:p>
-            <a:pPr>
+              <a:t>Groovy &amp; Python/</a:t>
+            </a:r>
+            <a:r>
+              <a:rPr lang="en-US" dirty="0" err="1" smtClean="0"/>
+              <a:t>Jython</a:t>
+            </a:r>
+            <a:r>
+              <a:rPr lang="en-US" dirty="0" smtClean="0"/>
+              <a:t> (at runtime!)</a:t>
+            </a:r>
+            <a:endParaRPr lang="en-US" dirty="0" smtClean="0"/>
+          </a:p>
+          <a:p>
+            <a:pPr lvl="1">
               <a:lnSpc>
-                <a:spcPct val="90000"/>
+                <a:spcPct val="80000"/>
               </a:lnSpc>
               <a:spcBef>
-                <a:spcPts val="1400"/>
+                <a:spcPts val="1200"/>
               </a:spcBef>
             </a:pPr>
             <a:r>
               <a:rPr lang="en-US" dirty="0" smtClean="0"/>
-              <a:t>Event listener support</a:t>
-            </a:r>
-          </a:p>
-          <a:p>
-            <a:pPr>
+              <a:t>using Java</a:t>
+            </a:r>
+          </a:p>
+          <a:p>
+            <a:pPr lvl="1">
               <a:lnSpc>
-                <a:spcPct val="90000"/>
+                <a:spcPct val="80000"/>
               </a:lnSpc>
               <a:spcBef>
-                <a:spcPts val="1400"/>
+                <a:spcPts val="1200"/>
               </a:spcBef>
             </a:pPr>
             <a:r>
               <a:rPr lang="en-US" dirty="0" smtClean="0"/>
-              <a:t>Tagging</a:t>
-            </a:r>
-          </a:p>
-          <a:p>
-            <a:endParaRPr lang="en-US" dirty="0"/>
+              <a:t>using closures (lambda expressions)</a:t>
+            </a:r>
           </a:p>
         </p:txBody>
       </p:sp>
     </p:spTree>
     <p:extLst>
       <p:ext uri="{BB962C8B-B14F-4D97-AF65-F5344CB8AC3E}">
-        <p14:creationId xmlns:p14="http://schemas.microsoft.com/office/powerpoint/2010/main" val="843770871"/>
+        <p14:creationId xmlns:p14="http://schemas.microsoft.com/office/powerpoint/2010/main" val="2180586827"/>
       </p:ext>
     </p:extLst>
   </p:cSld>
@@ -6611,7 +6694,7 @@
             <a:pPr algn="l"/>
             <a:r>
               <a:rPr lang="en-US" dirty="0" smtClean="0"/>
-              <a:t>Potential Use Cases</a:t>
+              <a:t>Sauces and Pickles</a:t>
             </a:r>
             <a:endParaRPr lang="en-US" dirty="0"/>
           </a:p>
@@ -6629,71 +6712,152 @@
         </p:nvSpPr>
         <p:spPr>
           <a:xfrm>
-            <a:off x="739775" y="2445855"/>
-            <a:ext cx="7662864" cy="3890322"/>
+            <a:off x="739775" y="2486384"/>
+            <a:ext cx="7662864" cy="3890323"/>
           </a:xfrm>
         </p:spPr>
         <p:txBody>
-          <a:bodyPr/>
-          <a:lstStyle/>
-          <a:p>
+          <a:bodyPr>
+            <a:normAutofit fontScale="92500" lnSpcReduction="20000"/>
+          </a:bodyPr>
+          <a:lstStyle/>
+          <a:p>
+            <a:pPr>
+              <a:lnSpc>
+                <a:spcPct val="90000"/>
+              </a:lnSpc>
+              <a:spcBef>
+                <a:spcPts val="1400"/>
+              </a:spcBef>
+            </a:pPr>
             <a:r>
               <a:rPr lang="en-US" dirty="0" smtClean="0"/>
-              <a:t>Heart of a modeling/ad-hoc data analysis application</a:t>
-            </a:r>
-          </a:p>
-          <a:p>
+              <a:t>Packaged with over 250 built-in operators</a:t>
+            </a:r>
+          </a:p>
+          <a:p>
+            <a:pPr>
+              <a:lnSpc>
+                <a:spcPct val="90000"/>
+              </a:lnSpc>
+              <a:spcBef>
+                <a:spcPts val="1400"/>
+              </a:spcBef>
+            </a:pPr>
+            <a:r>
+              <a:rPr lang="en-US" dirty="0"/>
+              <a:t>Integrated support for </a:t>
+            </a:r>
+            <a:r>
+              <a:rPr lang="en-US" dirty="0" err="1"/>
+              <a:t>RESTful</a:t>
+            </a:r>
+            <a:r>
+              <a:rPr lang="en-US" dirty="0"/>
+              <a:t> Web Services</a:t>
+            </a:r>
+          </a:p>
+          <a:p>
+            <a:pPr>
+              <a:lnSpc>
+                <a:spcPct val="90000"/>
+              </a:lnSpc>
+              <a:spcBef>
+                <a:spcPts val="1400"/>
+              </a:spcBef>
+            </a:pPr>
+            <a:r>
+              <a:rPr lang="en-US" dirty="0"/>
+              <a:t>Hybrid tables (RDBMS, Log File integration</a:t>
+            </a:r>
             <a:r>
               <a:rPr lang="en-US" dirty="0" smtClean="0"/>
-              <a:t>“Computed Fields” engine for </a:t>
-            </a:r>
-            <a:r>
-              <a:rPr lang="en-US" dirty="0" err="1" smtClean="0"/>
-              <a:t>SaaS</a:t>
-            </a:r>
+              <a:t>)</a:t>
+            </a:r>
+          </a:p>
+          <a:p>
+            <a:pPr>
+              <a:lnSpc>
+                <a:spcPct val="90000"/>
+              </a:lnSpc>
+              <a:spcBef>
+                <a:spcPts val="1400"/>
+              </a:spcBef>
+            </a:pPr>
             <a:r>
               <a:rPr lang="en-US" dirty="0" smtClean="0"/>
-              <a:t> applications</a:t>
-            </a:r>
-          </a:p>
-          <a:p>
+              <a:t>Feature-rich Excel integration (import and export, formulas)</a:t>
+            </a:r>
+          </a:p>
+          <a:p>
+            <a:pPr>
+              <a:lnSpc>
+                <a:spcPct val="90000"/>
+              </a:lnSpc>
+              <a:spcBef>
+                <a:spcPts val="1400"/>
+              </a:spcBef>
+            </a:pPr>
             <a:r>
               <a:rPr lang="en-US" dirty="0" smtClean="0"/>
-              <a:t>Reporting/Excel Export environment for </a:t>
-            </a:r>
-            <a:r>
-              <a:rPr lang="en-US" dirty="0" err="1" smtClean="0"/>
-              <a:t>SaaS</a:t>
-            </a:r>
+              <a:t>PDF, HTML, and MS Word export</a:t>
+            </a:r>
+          </a:p>
+          <a:p>
+            <a:pPr>
+              <a:lnSpc>
+                <a:spcPct val="90000"/>
+              </a:lnSpc>
+              <a:spcBef>
+                <a:spcPts val="1400"/>
+              </a:spcBef>
+            </a:pPr>
             <a:r>
               <a:rPr lang="en-US" dirty="0" smtClean="0"/>
-              <a:t> applications</a:t>
-            </a:r>
-          </a:p>
-          <a:p>
-            <a:r>
-              <a:rPr lang="en-US" dirty="0" err="1" smtClean="0"/>
-              <a:t>IoT</a:t>
-            </a:r>
+              <a:t>IFS to PFS to IFS expression parsing &amp; generation; can translate formulas from one language to another</a:t>
+            </a:r>
+          </a:p>
+          <a:p>
+            <a:pPr>
+              <a:lnSpc>
+                <a:spcPct val="90000"/>
+              </a:lnSpc>
+              <a:spcBef>
+                <a:spcPts val="1400"/>
+              </a:spcBef>
+            </a:pPr>
             <a:r>
               <a:rPr lang="en-US" dirty="0" smtClean="0"/>
-              <a:t> dashboard data aggregator</a:t>
-            </a:r>
-          </a:p>
-          <a:p>
+              <a:t>Cell validation/transformation support</a:t>
+            </a:r>
+          </a:p>
+          <a:p>
+            <a:pPr>
+              <a:lnSpc>
+                <a:spcPct val="90000"/>
+              </a:lnSpc>
+              <a:spcBef>
+                <a:spcPts val="1400"/>
+              </a:spcBef>
+            </a:pPr>
             <a:r>
               <a:rPr lang="en-US" dirty="0" smtClean="0"/>
-              <a:t>Workbench for function/operator prototyping/development</a:t>
-            </a:r>
-          </a:p>
-          <a:p>
+              <a:t>Event listener support</a:t>
+            </a:r>
+          </a:p>
+          <a:p>
+            <a:pPr>
+              <a:lnSpc>
+                <a:spcPct val="90000"/>
+              </a:lnSpc>
+              <a:spcBef>
+                <a:spcPts val="1400"/>
+              </a:spcBef>
+            </a:pPr>
             <a:r>
               <a:rPr lang="en-US" dirty="0" smtClean="0"/>
-              <a:t>Workbench for REST-based API experimentation</a:t>
-            </a:r>
-          </a:p>
-          <a:p>
-            <a:endParaRPr lang="en-US" dirty="0" smtClean="0"/>
+              <a:t>Tagging</a:t>
+            </a:r>
           </a:p>
           <a:p>
             <a:endParaRPr lang="en-US" dirty="0"/>
@@ -6703,7 +6867,7 @@
     </p:spTree>
     <p:extLst>
       <p:ext uri="{BB962C8B-B14F-4D97-AF65-F5344CB8AC3E}">
-        <p14:creationId xmlns:p14="http://schemas.microsoft.com/office/powerpoint/2010/main" val="3107410314"/>
+        <p14:creationId xmlns:p14="http://schemas.microsoft.com/office/powerpoint/2010/main" val="843770871"/>
       </p:ext>
     </p:extLst>
   </p:cSld>
@@ -6755,7 +6919,7 @@
             <a:pPr algn="l"/>
             <a:r>
               <a:rPr lang="en-US" dirty="0" smtClean="0"/>
-              <a:t>Architecture</a:t>
+              <a:t>Potential Use Cases</a:t>
             </a:r>
             <a:endParaRPr lang="en-US" dirty="0"/>
           </a:p>
@@ -6773,74 +6937,81 @@
         </p:nvSpPr>
         <p:spPr>
           <a:xfrm>
-            <a:off x="739775" y="2540425"/>
-            <a:ext cx="7662864" cy="3768732"/>
+            <a:off x="739775" y="2445855"/>
+            <a:ext cx="7662864" cy="3890322"/>
           </a:xfrm>
         </p:spPr>
         <p:txBody>
-          <a:bodyPr>
-            <a:normAutofit/>
-          </a:bodyPr>
+          <a:bodyPr/>
           <a:lstStyle/>
           <a:p>
             <a:r>
               <a:rPr lang="en-US" dirty="0" smtClean="0"/>
-              <a:t>Pure Java (JDK 1.8)</a:t>
-            </a:r>
-          </a:p>
-          <a:p>
+              <a:t>Heart of a modeling/ad-hoc data analysis application</a:t>
+            </a:r>
+          </a:p>
+          <a:p>
+            <a:r>
+              <a:rPr lang="en-US" dirty="0" smtClean="0"/>
+              <a:t>“Computed Fields” engine for </a:t>
+            </a:r>
             <a:r>
               <a:rPr lang="en-US" dirty="0" err="1" smtClean="0"/>
-              <a:t>Performant</a:t>
+              <a:t>SaaS</a:t>
             </a:r>
             <a:r>
               <a:rPr lang="en-US" dirty="0" smtClean="0"/>
-              <a:t> (sparse table cells, cell is 16 bytes)</a:t>
+              <a:t> applications</a:t>
             </a:r>
           </a:p>
           <a:p>
             <a:r>
               <a:rPr lang="en-US" dirty="0" smtClean="0"/>
-              <a:t>Interface-based API</a:t>
-            </a:r>
-          </a:p>
-          <a:p>
+              <a:t>Reporting/Excel Export environment for </a:t>
+            </a:r>
             <a:r>
               <a:rPr lang="en-US" dirty="0" err="1" smtClean="0"/>
-              <a:t>GitHub</a:t>
+              <a:t>SaaS</a:t>
             </a:r>
             <a:r>
               <a:rPr lang="en-US" dirty="0" smtClean="0"/>
-              <a:t> Repository &amp; Wiki</a:t>
+              <a:t> applications</a:t>
             </a:r>
           </a:p>
           <a:p>
             <a:r>
               <a:rPr lang="en-US" dirty="0" err="1" smtClean="0"/>
-              <a:t>Javadoc</a:t>
-            </a:r>
+              <a:t>IoT</a:t>
+            </a:r>
+            <a:r>
+              <a:rPr lang="en-US" dirty="0" smtClean="0"/>
+              <a:t> dashboard data aggregator</a:t>
+            </a:r>
+          </a:p>
+          <a:p>
+            <a:r>
+              <a:rPr lang="en-US" dirty="0" smtClean="0"/>
+              <a:t>Workbench for function/operator prototyping/development</a:t>
+            </a:r>
+          </a:p>
+          <a:p>
+            <a:r>
+              <a:rPr lang="en-US" dirty="0" smtClean="0"/>
+              <a:t>Workbench for REST-based API experimentation</a:t>
+            </a:r>
+          </a:p>
+          <a:p>
             <a:endParaRPr lang="en-US" dirty="0" smtClean="0"/>
           </a:p>
           <a:p>
-            <a:r>
-              <a:rPr lang="en-US" dirty="0" smtClean="0"/>
-              <a:t>Test-driven development (260 unit tests)</a:t>
-            </a:r>
-          </a:p>
-          <a:p>
-            <a:pPr lvl="1"/>
-            <a:r>
-              <a:rPr lang="en-US" dirty="0"/>
-              <a:t>34,000 lines of source code, 14,000 lines of unit test</a:t>
-            </a:r>
-            <a:endParaRPr lang="en-US" dirty="0" smtClean="0"/>
+            <a:endParaRPr lang="en-US" dirty="0"/>
           </a:p>
         </p:txBody>
       </p:sp>
     </p:spTree>
     <p:extLst>
       <p:ext uri="{BB962C8B-B14F-4D97-AF65-F5344CB8AC3E}">
-        <p14:creationId xmlns:p14="http://schemas.microsoft.com/office/powerpoint/2010/main" val="3647655822"/>
+        <p14:creationId xmlns:p14="http://schemas.microsoft.com/office/powerpoint/2010/main" val="3107410314"/>
       </p:ext>
     </p:extLst>
   </p:cSld>
@@ -6891,83 +7062,93 @@
           <a:p>
             <a:pPr algn="l"/>
             <a:r>
+              <a:rPr lang="en-US" dirty="0" smtClean="0"/>
+              <a:t>Architecture</a:t>
+            </a:r>
+            <a:endParaRPr lang="en-US" dirty="0"/>
+          </a:p>
+        </p:txBody>
+      </p:sp>
+      <p:sp>
+        <p:nvSpPr>
+          <p:cNvPr id="3" name="Content Placeholder 2"/>
+          <p:cNvSpPr>
+            <a:spLocks noGrp="1"/>
+          </p:cNvSpPr>
+          <p:nvPr>
+            <p:ph idx="1"/>
+          </p:nvPr>
+        </p:nvSpPr>
+        <p:spPr>
+          <a:xfrm>
+            <a:off x="739775" y="2540425"/>
+            <a:ext cx="7662864" cy="3768732"/>
+          </a:xfrm>
+        </p:spPr>
+        <p:txBody>
+          <a:bodyPr>
+            <a:normAutofit/>
+          </a:bodyPr>
+          <a:lstStyle/>
+          <a:p>
+            <a:r>
+              <a:rPr lang="en-US" dirty="0" smtClean="0"/>
+              <a:t>Pure Java (JDK 1.8)</a:t>
+            </a:r>
+          </a:p>
+          <a:p>
+            <a:r>
+              <a:rPr lang="en-US" dirty="0" err="1" smtClean="0"/>
+              <a:t>Performant</a:t>
+            </a:r>
+            <a:r>
+              <a:rPr lang="en-US" dirty="0" smtClean="0"/>
+              <a:t> (sparse table cells, cell is 16 bytes)</a:t>
+            </a:r>
+          </a:p>
+          <a:p>
+            <a:r>
+              <a:rPr lang="en-US" dirty="0" smtClean="0"/>
+              <a:t>Interface-based API</a:t>
+            </a:r>
+          </a:p>
+          <a:p>
+            <a:r>
+              <a:rPr lang="en-US" dirty="0" err="1" smtClean="0"/>
+              <a:t>GitHub</a:t>
+            </a:r>
+            <a:r>
+              <a:rPr lang="en-US" dirty="0" smtClean="0"/>
+              <a:t> Repository &amp; Wiki</a:t>
+            </a:r>
+          </a:p>
+          <a:p>
+            <a:r>
+              <a:rPr lang="en-US" dirty="0" err="1" smtClean="0"/>
+              <a:t>Javadoc</a:t>
+            </a:r>
+            <a:endParaRPr lang="en-US" dirty="0" smtClean="0"/>
+          </a:p>
+          <a:p>
+            <a:r>
+              <a:rPr lang="en-US" dirty="0" smtClean="0"/>
+              <a:t>Test-driven development (260 unit tests)</a:t>
+            </a:r>
+          </a:p>
+          <a:p>
+            <a:pPr lvl="1"/>
+            <a:r>
               <a:rPr lang="en-US" dirty="0"/>
-              <a:t>3</a:t>
-            </a:r>
-            <a:r>
-              <a:rPr lang="en-US" baseline="30000" dirty="0"/>
-              <a:t>rd</a:t>
-            </a:r>
-            <a:r>
-              <a:rPr lang="en-US" dirty="0"/>
-              <a:t> Party Libraries</a:t>
-            </a:r>
-          </a:p>
-        </p:txBody>
-      </p:sp>
-      <p:sp>
-        <p:nvSpPr>
-          <p:cNvPr id="3" name="Content Placeholder 2"/>
-          <p:cNvSpPr>
-            <a:spLocks noGrp="1"/>
-          </p:cNvSpPr>
-          <p:nvPr>
-            <p:ph idx="1"/>
-          </p:nvPr>
-        </p:nvSpPr>
-        <p:spPr/>
-        <p:txBody>
-          <a:bodyPr>
-            <a:normAutofit lnSpcReduction="10000"/>
-          </a:bodyPr>
-          <a:lstStyle/>
-          <a:p>
-            <a:r>
-              <a:rPr lang="en-US" dirty="0" smtClean="0"/>
-              <a:t>Jasper Reports</a:t>
-            </a:r>
-          </a:p>
-          <a:p>
-            <a:r>
-              <a:rPr lang="en-US" dirty="0" smtClean="0"/>
-              <a:t>Apache POI (Excel integration)</a:t>
-            </a:r>
-          </a:p>
-          <a:p>
-            <a:r>
-              <a:rPr lang="en-US" dirty="0" err="1" smtClean="0"/>
-              <a:t>Xstream</a:t>
-            </a:r>
-            <a:r>
-              <a:rPr lang="en-US" dirty="0" smtClean="0"/>
-              <a:t> (File IO)</a:t>
-            </a:r>
-          </a:p>
-          <a:p>
-            <a:r>
-              <a:rPr lang="en-US" dirty="0" smtClean="0"/>
-              <a:t>Commons CSV</a:t>
-            </a:r>
-          </a:p>
-          <a:p>
-            <a:r>
-              <a:rPr lang="en-US" dirty="0" smtClean="0"/>
-              <a:t>Commons Math (distributions, advanced math)</a:t>
-            </a:r>
-          </a:p>
-          <a:p>
-            <a:r>
-              <a:rPr lang="en-US" dirty="0" smtClean="0"/>
-              <a:t>JSON Simple</a:t>
-            </a:r>
-            <a:endParaRPr lang="en-US" dirty="0"/>
+              <a:t>34,000 lines of source code, 14,000 lines of unit test</a:t>
+            </a:r>
+            <a:endParaRPr lang="en-US" dirty="0" smtClean="0"/>
           </a:p>
         </p:txBody>
       </p:sp>
     </p:spTree>
     <p:extLst>
       <p:ext uri="{BB962C8B-B14F-4D97-AF65-F5344CB8AC3E}">
-        <p14:creationId xmlns:p14="http://schemas.microsoft.com/office/powerpoint/2010/main" val="1321442216"/>
+        <p14:creationId xmlns:p14="http://schemas.microsoft.com/office/powerpoint/2010/main" val="3647655822"/>
       </p:ext>
     </p:extLst>
   </p:cSld>

</xml_diff>

<commit_message>
Upgraded to new POI, Jasper Report libs and updated tests accordingly
</commit_message>
<xml_diff>
--- a/doc/TMS Overview.pptx
+++ b/doc/TMS Overview.pptx
@@ -312,7 +312,7 @@
           <a:p>
             <a:fld id="{679BC7E7-EA8E-4DA7-915E-CC098D9BADCB}" type="datetimeFigureOut">
               <a:rPr lang="en-US" smtClean="0"/>
-              <a:t>9/20/16</a:t>
+              <a:t>9/21/16</a:t>
             </a:fld>
             <a:endParaRPr lang="en-US"/>
           </a:p>
@@ -441,7 +441,7 @@
           <a:p>
             <a:fld id="{679BC7E7-EA8E-4DA7-915E-CC098D9BADCB}" type="datetimeFigureOut">
               <a:rPr lang="en-US" smtClean="0"/>
-              <a:t>9/20/16</a:t>
+              <a:t>9/21/16</a:t>
             </a:fld>
             <a:endParaRPr lang="en-US"/>
           </a:p>
@@ -746,7 +746,7 @@
           <a:p>
             <a:fld id="{679BC7E7-EA8E-4DA7-915E-CC098D9BADCB}" type="datetimeFigureOut">
               <a:rPr lang="en-US" smtClean="0"/>
-              <a:t>9/20/16</a:t>
+              <a:t>9/21/16</a:t>
             </a:fld>
             <a:endParaRPr lang="en-US"/>
           </a:p>
@@ -971,7 +971,7 @@
           <a:p>
             <a:fld id="{679BC7E7-EA8E-4DA7-915E-CC098D9BADCB}" type="datetimeFigureOut">
               <a:rPr lang="en-US" smtClean="0"/>
-              <a:t>9/20/16</a:t>
+              <a:t>9/21/16</a:t>
             </a:fld>
             <a:endParaRPr lang="en-US"/>
           </a:p>
@@ -1241,7 +1241,7 @@
           <a:p>
             <a:fld id="{679BC7E7-EA8E-4DA7-915E-CC098D9BADCB}" type="datetimeFigureOut">
               <a:rPr lang="en-US" smtClean="0"/>
-              <a:t>9/20/16</a:t>
+              <a:t>9/21/16</a:t>
             </a:fld>
             <a:endParaRPr lang="en-US"/>
           </a:p>
@@ -1566,7 +1566,7 @@
           <a:p>
             <a:fld id="{679BC7E7-EA8E-4DA7-915E-CC098D9BADCB}" type="datetimeFigureOut">
               <a:rPr lang="en-US" smtClean="0"/>
-              <a:t>9/20/16</a:t>
+              <a:t>9/21/16</a:t>
             </a:fld>
             <a:endParaRPr lang="en-US"/>
           </a:p>
@@ -1759,7 +1759,7 @@
           <a:p>
             <a:fld id="{679BC7E7-EA8E-4DA7-915E-CC098D9BADCB}" type="datetimeFigureOut">
               <a:rPr lang="en-US" smtClean="0"/>
-              <a:t>9/20/16</a:t>
+              <a:t>9/21/16</a:t>
             </a:fld>
             <a:endParaRPr lang="en-US"/>
           </a:p>
@@ -1863,7 +1863,7 @@
           <a:p>
             <a:fld id="{679BC7E7-EA8E-4DA7-915E-CC098D9BADCB}" type="datetimeFigureOut">
               <a:rPr lang="en-US" smtClean="0"/>
-              <a:t>9/20/16</a:t>
+              <a:t>9/21/16</a:t>
             </a:fld>
             <a:endParaRPr lang="en-US"/>
           </a:p>
@@ -2032,7 +2032,7 @@
           <a:p>
             <a:fld id="{679BC7E7-EA8E-4DA7-915E-CC098D9BADCB}" type="datetimeFigureOut">
               <a:rPr lang="en-US" smtClean="0"/>
-              <a:t>9/20/16</a:t>
+              <a:t>9/21/16</a:t>
             </a:fld>
             <a:endParaRPr lang="en-US"/>
           </a:p>
@@ -2296,7 +2296,7 @@
           <a:p>
             <a:fld id="{679BC7E7-EA8E-4DA7-915E-CC098D9BADCB}" type="datetimeFigureOut">
               <a:rPr lang="en-US" smtClean="0"/>
-              <a:t>9/20/16</a:t>
+              <a:t>9/21/16</a:t>
             </a:fld>
             <a:endParaRPr lang="en-US"/>
           </a:p>
@@ -2630,7 +2630,7 @@
           <a:p>
             <a:fld id="{679BC7E7-EA8E-4DA7-915E-CC098D9BADCB}" type="datetimeFigureOut">
               <a:rPr lang="en-US" smtClean="0"/>
-              <a:t>9/20/16</a:t>
+              <a:t>9/21/16</a:t>
             </a:fld>
             <a:endParaRPr lang="en-US"/>
           </a:p>
@@ -3071,7 +3071,7 @@
           <a:p>
             <a:fld id="{679BC7E7-EA8E-4DA7-915E-CC098D9BADCB}" type="datetimeFigureOut">
               <a:rPr lang="en-US" smtClean="0"/>
-              <a:t>9/20/16</a:t>
+              <a:t>9/21/16</a:t>
             </a:fld>
             <a:endParaRPr lang="en-US"/>
           </a:p>
@@ -3269,7 +3269,7 @@
           <a:p>
             <a:fld id="{679BC7E7-EA8E-4DA7-915E-CC098D9BADCB}" type="datetimeFigureOut">
               <a:rPr lang="en-US" smtClean="0"/>
-              <a:t>9/20/16</a:t>
+              <a:t>9/21/16</a:t>
             </a:fld>
             <a:endParaRPr lang="en-US"/>
           </a:p>
@@ -3552,7 +3552,7 @@
           <a:p>
             <a:fld id="{679BC7E7-EA8E-4DA7-915E-CC098D9BADCB}" type="datetimeFigureOut">
               <a:rPr lang="en-US" smtClean="0"/>
-              <a:t>9/20/16</a:t>
+              <a:t>9/21/16</a:t>
             </a:fld>
             <a:endParaRPr lang="en-US"/>
           </a:p>
@@ -3920,7 +3920,7 @@
           <a:p>
             <a:fld id="{679BC7E7-EA8E-4DA7-915E-CC098D9BADCB}" type="datetimeFigureOut">
               <a:rPr lang="en-US" smtClean="0"/>
-              <a:t>9/20/16</a:t>
+              <a:t>9/21/16</a:t>
             </a:fld>
             <a:endParaRPr lang="en-US"/>
           </a:p>
@@ -4416,7 +4416,7 @@
           <a:p>
             <a:fld id="{679BC7E7-EA8E-4DA7-915E-CC098D9BADCB}" type="datetimeFigureOut">
               <a:rPr lang="en-US" smtClean="0"/>
-              <a:t>9/20/16</a:t>
+              <a:t>9/21/16</a:t>
             </a:fld>
             <a:endParaRPr lang="en-US"/>
           </a:p>
@@ -4625,7 +4625,7 @@
           <a:p>
             <a:fld id="{679BC7E7-EA8E-4DA7-915E-CC098D9BADCB}" type="datetimeFigureOut">
               <a:rPr lang="en-US" smtClean="0"/>
-              <a:t>9/20/16</a:t>
+              <a:t>9/21/16</a:t>
             </a:fld>
             <a:endParaRPr lang="en-US"/>
           </a:p>
@@ -5087,7 +5087,12 @@
             <p:ph type="ctrTitle"/>
           </p:nvPr>
         </p:nvSpPr>
-        <p:spPr/>
+        <p:spPr>
+          <a:xfrm>
+            <a:off x="457199" y="1295401"/>
+            <a:ext cx="8228013" cy="1358900"/>
+          </a:xfrm>
+        </p:spPr>
         <p:txBody>
           <a:bodyPr/>
           <a:lstStyle/>
@@ -5099,11 +5104,7 @@
             <a:br>
               <a:rPr lang="en-US" dirty="0" smtClean="0"/>
             </a:br>
-            <a:r>
-              <a:rPr lang="en-US" sz="5400" dirty="0" smtClean="0"/>
-              <a:t>Table Management System</a:t>
-            </a:r>
-            <a:endParaRPr lang="en-US" sz="5400" dirty="0"/>
+            <a:endParaRPr lang="en-US" sz="4000" dirty="0"/>
           </a:p>
         </p:txBody>
       </p:sp>
@@ -5117,12 +5118,35 @@
             <p:ph type="subTitle" idx="1"/>
           </p:nvPr>
         </p:nvSpPr>
-        <p:spPr/>
-        <p:txBody>
-          <a:bodyPr/>
-          <a:lstStyle/>
-          <a:p>
-            <a:endParaRPr lang="en-US" dirty="0"/>
+        <p:spPr>
+          <a:xfrm>
+            <a:off x="203201" y="2234452"/>
+            <a:ext cx="8737600" cy="1066800"/>
+          </a:xfrm>
+        </p:spPr>
+        <p:txBody>
+          <a:bodyPr>
+            <a:noAutofit/>
+          </a:bodyPr>
+          <a:lstStyle/>
+          <a:p>
+            <a:r>
+              <a:rPr lang="en-US" sz="3400" dirty="0"/>
+              <a:t>A Modeling and </a:t>
+            </a:r>
+            <a:r>
+              <a:rPr lang="en-US" sz="3400" i="1" dirty="0"/>
+              <a:t>Ad-hoc</a:t>
+            </a:r>
+            <a:r>
+              <a:rPr lang="en-US" sz="3400" dirty="0"/>
+              <a:t> Analysis Framewor</a:t>
+            </a:r>
+            <a:r>
+              <a:rPr lang="en-US" sz="3600" dirty="0"/>
+              <a:t>k</a:t>
+            </a:r>
+            <a:endParaRPr lang="en-US" sz="3600" dirty="0"/>
           </a:p>
         </p:txBody>
       </p:sp>
@@ -6731,8 +6755,33 @@
             </a:pPr>
             <a:r>
               <a:rPr lang="en-US" dirty="0" smtClean="0"/>
-              <a:t>Packaged with over 250 built-in operators</a:t>
-            </a:r>
+              <a:t>Packaged with over </a:t>
+            </a:r>
+            <a:r>
+              <a:rPr lang="en-US" dirty="0" smtClean="0"/>
+              <a:t>300</a:t>
+            </a:r>
+            <a:r>
+              <a:rPr lang="en-US" dirty="0" smtClean="0"/>
+              <a:t> </a:t>
+            </a:r>
+            <a:r>
+              <a:rPr lang="en-US" dirty="0" smtClean="0"/>
+              <a:t>built-in </a:t>
+            </a:r>
+            <a:r>
+              <a:rPr lang="en-US" dirty="0" smtClean="0"/>
+              <a:t>operators (</a:t>
+            </a:r>
+            <a:r>
+              <a:rPr lang="en-US" i="1" dirty="0" smtClean="0"/>
+              <a:t>Nibbles</a:t>
+            </a:r>
+            <a:r>
+              <a:rPr lang="en-US" dirty="0" smtClean="0"/>
+              <a:t>)</a:t>
+            </a:r>
+            <a:endParaRPr lang="en-US" dirty="0" smtClean="0"/>
           </a:p>
           <a:p>
             <a:pPr>
@@ -7131,14 +7180,26 @@
           <a:p>
             <a:r>
               <a:rPr lang="en-US" dirty="0" smtClean="0"/>
-              <a:t>Test-driven development (260 unit tests)</a:t>
+              <a:t>Test-driven development (</a:t>
+            </a:r>
+            <a:r>
+              <a:rPr lang="en-US" dirty="0" smtClean="0"/>
+              <a:t>290 </a:t>
+            </a:r>
+            <a:r>
+              <a:rPr lang="en-US" dirty="0" smtClean="0"/>
+              <a:t>unit tests)</a:t>
             </a:r>
           </a:p>
           <a:p>
             <a:pPr lvl="1"/>
             <a:r>
+              <a:rPr lang="en-US" dirty="0" smtClean="0"/>
+              <a:t>43,000 </a:t>
+            </a:r>
+            <a:r>
               <a:rPr lang="en-US" dirty="0"/>
-              <a:t>34,000 lines of source code, 14,000 lines of unit test</a:t>
+              <a:t>lines of source code, 14,000 lines of unit test</a:t>
             </a:r>
             <a:endParaRPr lang="en-US" dirty="0" smtClean="0"/>
           </a:p>

</xml_diff>